<commit_message>
Modifying and Addding Documents
Updates to PowerPoint
</commit_message>
<xml_diff>
--- a/Assignments/Week01/Presentation_WEEK01.pptx
+++ b/Assignments/Week01/Presentation_WEEK01.pptx
@@ -6,16 +6,19 @@
   </p:sldMasterIdLst>
   <p:sldIdLst>
     <p:sldId id="256" r:id="rId2"/>
-    <p:sldId id="257" r:id="rId3"/>
-    <p:sldId id="258" r:id="rId4"/>
-    <p:sldId id="259" r:id="rId5"/>
-    <p:sldId id="261" r:id="rId6"/>
-    <p:sldId id="262" r:id="rId7"/>
-    <p:sldId id="263" r:id="rId8"/>
-    <p:sldId id="264" r:id="rId9"/>
-    <p:sldId id="265" r:id="rId10"/>
-    <p:sldId id="267" r:id="rId11"/>
-    <p:sldId id="266" r:id="rId12"/>
+    <p:sldId id="268" r:id="rId3"/>
+    <p:sldId id="257" r:id="rId4"/>
+    <p:sldId id="258" r:id="rId5"/>
+    <p:sldId id="259" r:id="rId6"/>
+    <p:sldId id="261" r:id="rId7"/>
+    <p:sldId id="262" r:id="rId8"/>
+    <p:sldId id="263" r:id="rId9"/>
+    <p:sldId id="264" r:id="rId10"/>
+    <p:sldId id="269" r:id="rId11"/>
+    <p:sldId id="270" r:id="rId12"/>
+    <p:sldId id="265" r:id="rId13"/>
+    <p:sldId id="267" r:id="rId14"/>
+    <p:sldId id="266" r:id="rId15"/>
   </p:sldIdLst>
   <p:sldSz cx="12192000" cy="6858000"/>
   <p:notesSz cx="6858000" cy="9144000"/>
@@ -10106,7 +10109,7 @@
           <a:p>
             <a:fld id="{A25D1C78-918D-4861-9F72-DED68DECE808}" type="datetimeFigureOut">
               <a:rPr lang="en-US" smtClean="0"/>
-              <a:t>8/27/2020</a:t>
+              <a:t>8/29/2020</a:t>
             </a:fld>
             <a:endParaRPr lang="en-US"/>
           </a:p>
@@ -10304,7 +10307,7 @@
           <a:p>
             <a:fld id="{A25D1C78-918D-4861-9F72-DED68DECE808}" type="datetimeFigureOut">
               <a:rPr lang="en-US" smtClean="0"/>
-              <a:t>8/27/2020</a:t>
+              <a:t>8/29/2020</a:t>
             </a:fld>
             <a:endParaRPr lang="en-US"/>
           </a:p>
@@ -10512,7 +10515,7 @@
           <a:p>
             <a:fld id="{A25D1C78-918D-4861-9F72-DED68DECE808}" type="datetimeFigureOut">
               <a:rPr lang="en-US" smtClean="0"/>
-              <a:t>8/27/2020</a:t>
+              <a:t>8/29/2020</a:t>
             </a:fld>
             <a:endParaRPr lang="en-US"/>
           </a:p>
@@ -10710,7 +10713,7 @@
           <a:p>
             <a:fld id="{A25D1C78-918D-4861-9F72-DED68DECE808}" type="datetimeFigureOut">
               <a:rPr lang="en-US" smtClean="0"/>
-              <a:t>8/27/2020</a:t>
+              <a:t>8/29/2020</a:t>
             </a:fld>
             <a:endParaRPr lang="en-US"/>
           </a:p>
@@ -10985,7 +10988,7 @@
           <a:p>
             <a:fld id="{A25D1C78-918D-4861-9F72-DED68DECE808}" type="datetimeFigureOut">
               <a:rPr lang="en-US" smtClean="0"/>
-              <a:t>8/27/2020</a:t>
+              <a:t>8/29/2020</a:t>
             </a:fld>
             <a:endParaRPr lang="en-US"/>
           </a:p>
@@ -11250,7 +11253,7 @@
           <a:p>
             <a:fld id="{A25D1C78-918D-4861-9F72-DED68DECE808}" type="datetimeFigureOut">
               <a:rPr lang="en-US" smtClean="0"/>
-              <a:t>8/27/2020</a:t>
+              <a:t>8/29/2020</a:t>
             </a:fld>
             <a:endParaRPr lang="en-US"/>
           </a:p>
@@ -11662,7 +11665,7 @@
           <a:p>
             <a:fld id="{A25D1C78-918D-4861-9F72-DED68DECE808}" type="datetimeFigureOut">
               <a:rPr lang="en-US" smtClean="0"/>
-              <a:t>8/27/2020</a:t>
+              <a:t>8/29/2020</a:t>
             </a:fld>
             <a:endParaRPr lang="en-US"/>
           </a:p>
@@ -11803,7 +11806,7 @@
           <a:p>
             <a:fld id="{A25D1C78-918D-4861-9F72-DED68DECE808}" type="datetimeFigureOut">
               <a:rPr lang="en-US" smtClean="0"/>
-              <a:t>8/27/2020</a:t>
+              <a:t>8/29/2020</a:t>
             </a:fld>
             <a:endParaRPr lang="en-US"/>
           </a:p>
@@ -11916,7 +11919,7 @@
           <a:p>
             <a:fld id="{A25D1C78-918D-4861-9F72-DED68DECE808}" type="datetimeFigureOut">
               <a:rPr lang="en-US" smtClean="0"/>
-              <a:t>8/27/2020</a:t>
+              <a:t>8/29/2020</a:t>
             </a:fld>
             <a:endParaRPr lang="en-US"/>
           </a:p>
@@ -12227,7 +12230,7 @@
           <a:p>
             <a:fld id="{A25D1C78-918D-4861-9F72-DED68DECE808}" type="datetimeFigureOut">
               <a:rPr lang="en-US" smtClean="0"/>
-              <a:t>8/27/2020</a:t>
+              <a:t>8/29/2020</a:t>
             </a:fld>
             <a:endParaRPr lang="en-US"/>
           </a:p>
@@ -12515,7 +12518,7 @@
           <a:p>
             <a:fld id="{A25D1C78-918D-4861-9F72-DED68DECE808}" type="datetimeFigureOut">
               <a:rPr lang="en-US" smtClean="0"/>
-              <a:t>8/27/2020</a:t>
+              <a:t>8/29/2020</a:t>
             </a:fld>
             <a:endParaRPr lang="en-US"/>
           </a:p>
@@ -12756,7 +12759,7 @@
           <a:p>
             <a:fld id="{A25D1C78-918D-4861-9F72-DED68DECE808}" type="datetimeFigureOut">
               <a:rPr lang="en-US" smtClean="0"/>
-              <a:t>8/27/2020</a:t>
+              <a:t>8/29/2020</a:t>
             </a:fld>
             <a:endParaRPr lang="en-US"/>
           </a:p>
@@ -13214,7 +13217,7 @@
           <a:p>
             <a:pPr algn="l"/>
             <a:r>
-              <a:rPr lang="en-US" sz="5400"/>
+              <a:rPr lang="en-US" sz="5400" dirty="0"/>
               <a:t>WEEK 1</a:t>
             </a:r>
           </a:p>
@@ -13250,7 +13253,7 @@
           <a:p>
             <a:pPr algn="l"/>
             <a:r>
-              <a:rPr lang="en-US" sz="2000"/>
+              <a:rPr lang="en-US" sz="2000" dirty="0"/>
               <a:t>Application Development and Software Prototyping</a:t>
             </a:r>
           </a:p>
@@ -13512,6 +13515,1853 @@
 </file>
 
 <file path=ppt/slides/slide10.xml><?xml version="1.0" encoding="utf-8"?>
+<p:sld xmlns:a="http://schemas.openxmlformats.org/drawingml/2006/main" xmlns:r="http://schemas.openxmlformats.org/officeDocument/2006/relationships" xmlns:p="http://schemas.openxmlformats.org/presentationml/2006/main">
+  <p:cSld>
+    <p:bg>
+      <p:bgPr>
+        <a:solidFill>
+          <a:schemeClr val="bg1"/>
+        </a:solidFill>
+        <a:effectLst/>
+      </p:bgPr>
+    </p:bg>
+    <p:spTree>
+      <p:nvGrpSpPr>
+        <p:cNvPr id="1" name=""/>
+        <p:cNvGrpSpPr/>
+        <p:nvPr/>
+      </p:nvGrpSpPr>
+      <p:grpSpPr>
+        <a:xfrm>
+          <a:off x="0" y="0"/>
+          <a:ext cx="0" cy="0"/>
+          <a:chOff x="0" y="0"/>
+          <a:chExt cx="0" cy="0"/>
+        </a:xfrm>
+      </p:grpSpPr>
+      <p:sp useBgFill="1">
+        <p:nvSpPr>
+          <p:cNvPr id="8" name="Rectangle 7">
+            <a:extLst>
+              <a:ext uri="{FF2B5EF4-FFF2-40B4-BE49-F238E27FC236}">
+                <a16:creationId xmlns:a16="http://schemas.microsoft.com/office/drawing/2014/main" id="{DAF1966E-FD40-4A4A-B61B-C4DF7FA05F06}"/>
+              </a:ext>
+              <a:ext uri="{C183D7F6-B498-43B3-948B-1728B52AA6E4}">
+                <adec:decorative xmlns:adec="http://schemas.microsoft.com/office/drawing/2017/decorative" val="1"/>
+              </a:ext>
+            </a:extLst>
+          </p:cNvPr>
+          <p:cNvSpPr>
+            <a:spLocks noGrp="1" noRot="1" noChangeAspect="1" noMove="1" noResize="1" noEditPoints="1" noAdjustHandles="1" noChangeArrowheads="1" noChangeShapeType="1" noTextEdit="1"/>
+          </p:cNvSpPr>
+          <p:nvPr>
+            <p:extLst>
+              <p:ext uri="{386F3935-93C4-4BCD-93E2-E3B085C9AB24}">
+                <p16:designElem xmlns:p16="http://schemas.microsoft.com/office/powerpoint/2015/main" val="1"/>
+              </p:ext>
+            </p:extLst>
+          </p:nvPr>
+        </p:nvSpPr>
+        <p:spPr>
+          <a:xfrm>
+            <a:off x="0" y="0"/>
+            <a:ext cx="12192000" cy="6858000"/>
+          </a:xfrm>
+          <a:prstGeom prst="rect">
+            <a:avLst/>
+          </a:prstGeom>
+          <a:ln>
+            <a:noFill/>
+          </a:ln>
+        </p:spPr>
+        <p:style>
+          <a:lnRef idx="2">
+            <a:schemeClr val="accent1">
+              <a:shade val="50000"/>
+            </a:schemeClr>
+          </a:lnRef>
+          <a:fillRef idx="1">
+            <a:schemeClr val="accent1"/>
+          </a:fillRef>
+          <a:effectRef idx="0">
+            <a:schemeClr val="accent1"/>
+          </a:effectRef>
+          <a:fontRef idx="minor">
+            <a:schemeClr val="lt1"/>
+          </a:fontRef>
+        </p:style>
+        <p:txBody>
+          <a:bodyPr rtlCol="0" anchor="ctr"/>
+          <a:lstStyle/>
+          <a:p>
+            <a:pPr algn="ctr"/>
+            <a:endParaRPr lang="en-US"/>
+          </a:p>
+        </p:txBody>
+      </p:sp>
+      <p:sp useBgFill="1">
+        <p:nvSpPr>
+          <p:cNvPr id="10" name="Rectangle 9">
+            <a:extLst>
+              <a:ext uri="{FF2B5EF4-FFF2-40B4-BE49-F238E27FC236}">
+                <a16:creationId xmlns:a16="http://schemas.microsoft.com/office/drawing/2014/main" id="{047BFA19-D45E-416B-A404-7AF2F3F27017}"/>
+              </a:ext>
+              <a:ext uri="{C183D7F6-B498-43B3-948B-1728B52AA6E4}">
+                <adec:decorative xmlns:adec="http://schemas.microsoft.com/office/drawing/2017/decorative" val="1"/>
+              </a:ext>
+            </a:extLst>
+          </p:cNvPr>
+          <p:cNvSpPr>
+            <a:spLocks noGrp="1" noRot="1" noChangeAspect="1" noMove="1" noResize="1" noEditPoints="1" noAdjustHandles="1" noChangeArrowheads="1" noChangeShapeType="1" noTextEdit="1"/>
+          </p:cNvSpPr>
+          <p:nvPr>
+            <p:extLst>
+              <p:ext uri="{386F3935-93C4-4BCD-93E2-E3B085C9AB24}">
+                <p16:designElem xmlns:p16="http://schemas.microsoft.com/office/powerpoint/2015/main" val="1"/>
+              </p:ext>
+            </p:extLst>
+          </p:nvPr>
+        </p:nvSpPr>
+        <p:spPr>
+          <a:xfrm>
+            <a:off x="558209" y="0"/>
+            <a:ext cx="11167447" cy="2018806"/>
+          </a:xfrm>
+          <a:prstGeom prst="rect">
+            <a:avLst/>
+          </a:prstGeom>
+          <a:ln w="9525">
+            <a:solidFill>
+              <a:srgbClr val="E1E1E1"/>
+            </a:solidFill>
+          </a:ln>
+          <a:effectLst>
+            <a:outerShdw blurRad="50800" dist="38100" dir="2700000" algn="tl" rotWithShape="0">
+              <a:schemeClr val="bg1">
+                <a:lumMod val="85000"/>
+                <a:alpha val="50000"/>
+              </a:schemeClr>
+            </a:outerShdw>
+          </a:effectLst>
+        </p:spPr>
+        <p:style>
+          <a:lnRef idx="2">
+            <a:schemeClr val="accent1">
+              <a:shade val="50000"/>
+            </a:schemeClr>
+          </a:lnRef>
+          <a:fillRef idx="1">
+            <a:schemeClr val="accent1"/>
+          </a:fillRef>
+          <a:effectRef idx="0">
+            <a:schemeClr val="accent1"/>
+          </a:effectRef>
+          <a:fontRef idx="minor">
+            <a:schemeClr val="lt1"/>
+          </a:fontRef>
+        </p:style>
+        <p:txBody>
+          <a:bodyPr rtlCol="0" anchor="ctr"/>
+          <a:lstStyle/>
+          <a:p>
+            <a:pPr marL="0" marR="0" lvl="0" indent="0" algn="ctr" defTabSz="914400" rtl="0" eaLnBrk="1" fontAlgn="auto" latinLnBrk="0" hangingPunct="1">
+              <a:lnSpc>
+                <a:spcPct val="100000"/>
+              </a:lnSpc>
+              <a:spcBef>
+                <a:spcPts val="0"/>
+              </a:spcBef>
+              <a:spcAft>
+                <a:spcPts val="0"/>
+              </a:spcAft>
+              <a:buClrTx/>
+              <a:buSzTx/>
+              <a:buFontTx/>
+              <a:buNone/>
+              <a:tabLst/>
+              <a:defRPr/>
+            </a:pPr>
+            <a:endParaRPr kumimoji="0" lang="en-US" sz="1800" b="0" i="0" u="none" strike="noStrike" kern="1200" cap="none" spc="0" normalizeH="0" baseline="0" noProof="0">
+              <a:ln>
+                <a:noFill/>
+              </a:ln>
+              <a:solidFill>
+                <a:prstClr val="white"/>
+              </a:solidFill>
+              <a:effectLst/>
+              <a:uLnTx/>
+              <a:uFillTx/>
+              <a:latin typeface="Calibri" panose="020F0502020204030204"/>
+              <a:ea typeface="+mn-ea"/>
+              <a:cs typeface="+mn-cs"/>
+            </a:endParaRPr>
+          </a:p>
+        </p:txBody>
+      </p:sp>
+      <p:sp useBgFill="1">
+        <p:nvSpPr>
+          <p:cNvPr id="12" name="Rectangle 11">
+            <a:extLst>
+              <a:ext uri="{FF2B5EF4-FFF2-40B4-BE49-F238E27FC236}">
+                <a16:creationId xmlns:a16="http://schemas.microsoft.com/office/drawing/2014/main" id="{8E0105E7-23DB-4CF2-8258-FF47C7620F6E}"/>
+              </a:ext>
+              <a:ext uri="{C183D7F6-B498-43B3-948B-1728B52AA6E4}">
+                <adec:decorative xmlns:adec="http://schemas.microsoft.com/office/drawing/2017/decorative" val="1"/>
+              </a:ext>
+            </a:extLst>
+          </p:cNvPr>
+          <p:cNvSpPr>
+            <a:spLocks noGrp="1" noRot="1" noChangeAspect="1" noMove="1" noResize="1" noEditPoints="1" noAdjustHandles="1" noChangeArrowheads="1" noChangeShapeType="1" noTextEdit="1"/>
+          </p:cNvSpPr>
+          <p:nvPr>
+            <p:extLst>
+              <p:ext uri="{386F3935-93C4-4BCD-93E2-E3B085C9AB24}">
+                <p16:designElem xmlns:p16="http://schemas.microsoft.com/office/powerpoint/2015/main" val="1"/>
+              </p:ext>
+            </p:extLst>
+          </p:nvPr>
+        </p:nvSpPr>
+        <p:spPr>
+          <a:xfrm>
+            <a:off x="566928" y="0"/>
+            <a:ext cx="11155680" cy="2011680"/>
+          </a:xfrm>
+          <a:prstGeom prst="rect">
+            <a:avLst/>
+          </a:prstGeom>
+          <a:ln w="9525">
+            <a:noFill/>
+          </a:ln>
+          <a:effectLst/>
+        </p:spPr>
+        <p:style>
+          <a:lnRef idx="2">
+            <a:schemeClr val="accent1">
+              <a:shade val="50000"/>
+            </a:schemeClr>
+          </a:lnRef>
+          <a:fillRef idx="1">
+            <a:schemeClr val="accent1"/>
+          </a:fillRef>
+          <a:effectRef idx="0">
+            <a:schemeClr val="accent1"/>
+          </a:effectRef>
+          <a:fontRef idx="minor">
+            <a:schemeClr val="lt1"/>
+          </a:fontRef>
+        </p:style>
+        <p:txBody>
+          <a:bodyPr rtlCol="0" anchor="ctr"/>
+          <a:lstStyle/>
+          <a:p>
+            <a:pPr marL="0" marR="0" lvl="0" indent="0" algn="ctr" defTabSz="914400" rtl="0" eaLnBrk="1" fontAlgn="auto" latinLnBrk="0" hangingPunct="1">
+              <a:lnSpc>
+                <a:spcPct val="100000"/>
+              </a:lnSpc>
+              <a:spcBef>
+                <a:spcPts val="0"/>
+              </a:spcBef>
+              <a:spcAft>
+                <a:spcPts val="0"/>
+              </a:spcAft>
+              <a:buClrTx/>
+              <a:buSzTx/>
+              <a:buFontTx/>
+              <a:buNone/>
+              <a:tabLst/>
+              <a:defRPr/>
+            </a:pPr>
+            <a:endParaRPr kumimoji="0" lang="en-US" sz="1800" b="0" i="0" u="none" strike="noStrike" kern="1200" cap="none" spc="0" normalizeH="0" baseline="0" noProof="0">
+              <a:ln>
+                <a:noFill/>
+              </a:ln>
+              <a:solidFill>
+                <a:prstClr val="white"/>
+              </a:solidFill>
+              <a:effectLst/>
+              <a:uLnTx/>
+              <a:uFillTx/>
+              <a:latin typeface="Calibri" panose="020F0502020204030204"/>
+              <a:ea typeface="+mn-ea"/>
+              <a:cs typeface="+mn-cs"/>
+            </a:endParaRPr>
+          </a:p>
+        </p:txBody>
+      </p:sp>
+      <p:sp>
+        <p:nvSpPr>
+          <p:cNvPr id="14" name="Rectangle 13">
+            <a:extLst>
+              <a:ext uri="{FF2B5EF4-FFF2-40B4-BE49-F238E27FC236}">
+                <a16:creationId xmlns:a16="http://schemas.microsoft.com/office/drawing/2014/main" id="{074B4F7D-14B2-478B-8BF5-01E4E0C5D263}"/>
+              </a:ext>
+              <a:ext uri="{C183D7F6-B498-43B3-948B-1728B52AA6E4}">
+                <adec:decorative xmlns:adec="http://schemas.microsoft.com/office/drawing/2017/decorative" val="1"/>
+              </a:ext>
+            </a:extLst>
+          </p:cNvPr>
+          <p:cNvSpPr>
+            <a:spLocks noGrp="1" noRot="1" noChangeAspect="1" noMove="1" noResize="1" noEditPoints="1" noAdjustHandles="1" noChangeArrowheads="1" noChangeShapeType="1" noTextEdit="1"/>
+          </p:cNvSpPr>
+          <p:nvPr>
+            <p:extLst>
+              <p:ext uri="{386F3935-93C4-4BCD-93E2-E3B085C9AB24}">
+                <p16:designElem xmlns:p16="http://schemas.microsoft.com/office/powerpoint/2015/main" val="1"/>
+              </p:ext>
+            </p:extLst>
+          </p:nvPr>
+        </p:nvSpPr>
+        <p:spPr>
+          <a:xfrm>
+            <a:off x="498834" y="758952"/>
+            <a:ext cx="128016" cy="704088"/>
+          </a:xfrm>
+          <a:prstGeom prst="rect">
+            <a:avLst/>
+          </a:prstGeom>
+          <a:solidFill>
+            <a:schemeClr val="accent2"/>
+          </a:solidFill>
+          <a:ln>
+            <a:noFill/>
+          </a:ln>
+        </p:spPr>
+        <p:style>
+          <a:lnRef idx="2">
+            <a:schemeClr val="accent1">
+              <a:shade val="50000"/>
+            </a:schemeClr>
+          </a:lnRef>
+          <a:fillRef idx="1">
+            <a:schemeClr val="accent1"/>
+          </a:fillRef>
+          <a:effectRef idx="0">
+            <a:schemeClr val="accent1"/>
+          </a:effectRef>
+          <a:fontRef idx="minor">
+            <a:schemeClr val="lt1"/>
+          </a:fontRef>
+        </p:style>
+        <p:txBody>
+          <a:bodyPr rtlCol="0" anchor="ctr"/>
+          <a:lstStyle/>
+          <a:p>
+            <a:pPr algn="ctr"/>
+            <a:endParaRPr lang="en-US">
+              <a:solidFill>
+                <a:prstClr val="white"/>
+              </a:solidFill>
+              <a:latin typeface="Calibri" panose="020F0502020204030204"/>
+            </a:endParaRPr>
+          </a:p>
+        </p:txBody>
+      </p:sp>
+      <p:sp>
+        <p:nvSpPr>
+          <p:cNvPr id="16" name="Title 1">
+            <a:extLst>
+              <a:ext uri="{FF2B5EF4-FFF2-40B4-BE49-F238E27FC236}">
+                <a16:creationId xmlns:a16="http://schemas.microsoft.com/office/drawing/2014/main" id="{C83D6A4E-8F21-43C5-B459-0611CB001524}"/>
+              </a:ext>
+            </a:extLst>
+          </p:cNvPr>
+          <p:cNvSpPr>
+            <a:spLocks noGrp="1"/>
+          </p:cNvSpPr>
+          <p:nvPr>
+            <p:ph type="title"/>
+          </p:nvPr>
+        </p:nvSpPr>
+        <p:spPr>
+          <a:xfrm>
+            <a:off x="2549932" y="548640"/>
+            <a:ext cx="8733763" cy="1179576"/>
+          </a:xfrm>
+        </p:spPr>
+        <p:txBody>
+          <a:bodyPr>
+            <a:normAutofit/>
+          </a:bodyPr>
+          <a:lstStyle/>
+          <a:p>
+            <a:r>
+              <a:rPr lang="en-US" sz="4000" dirty="0"/>
+              <a:t>ANDROID DEVELOPMENT</a:t>
+            </a:r>
+          </a:p>
+        </p:txBody>
+      </p:sp>
+      <p:sp>
+        <p:nvSpPr>
+          <p:cNvPr id="13" name="Rectangle 12" descr="Smart Phone">
+            <a:extLst>
+              <a:ext uri="{FF2B5EF4-FFF2-40B4-BE49-F238E27FC236}">
+                <a16:creationId xmlns:a16="http://schemas.microsoft.com/office/drawing/2014/main" id="{E87100C8-6599-45F4-9770-31D2BE8527E8}"/>
+              </a:ext>
+            </a:extLst>
+          </p:cNvPr>
+          <p:cNvSpPr/>
+          <p:nvPr/>
+        </p:nvSpPr>
+        <p:spPr>
+          <a:xfrm>
+            <a:off x="908303" y="446343"/>
+            <a:ext cx="1314779" cy="1314779"/>
+          </a:xfrm>
+          <a:prstGeom prst="rect">
+            <a:avLst/>
+          </a:prstGeom>
+          <a:blipFill>
+            <a:blip r:embed="rId2">
+              <a:extLst>
+                <a:ext uri="{28A0092B-C50C-407E-A947-70E740481C1C}">
+                  <a14:useLocalDpi xmlns:a14="http://schemas.microsoft.com/office/drawing/2010/main" val="0"/>
+                </a:ext>
+                <a:ext uri="{96DAC541-7B7A-43D3-8B79-37D633B846F1}">
+                  <asvg:svgBlip xmlns:asvg="http://schemas.microsoft.com/office/drawing/2016/SVG/main" r:embed="rId3"/>
+                </a:ext>
+              </a:extLst>
+            </a:blip>
+            <a:stretch>
+              <a:fillRect/>
+            </a:stretch>
+          </a:blipFill>
+          <a:ln>
+            <a:noFill/>
+          </a:ln>
+        </p:spPr>
+        <p:style>
+          <a:lnRef idx="2">
+            <a:scrgbClr r="0" g="0" b="0"/>
+          </a:lnRef>
+          <a:fillRef idx="1">
+            <a:scrgbClr r="0" g="0" b="0"/>
+          </a:fillRef>
+          <a:effectRef idx="0">
+            <a:schemeClr val="accent3">
+              <a:hueOff val="0"/>
+              <a:satOff val="0"/>
+              <a:lumOff val="0"/>
+              <a:alphaOff val="0"/>
+            </a:schemeClr>
+          </a:effectRef>
+          <a:fontRef idx="minor">
+            <a:schemeClr val="lt1"/>
+          </a:fontRef>
+        </p:style>
+      </p:sp>
+      <p:sp>
+        <p:nvSpPr>
+          <p:cNvPr id="7" name="TextBox 6">
+            <a:extLst>
+              <a:ext uri="{FF2B5EF4-FFF2-40B4-BE49-F238E27FC236}">
+                <a16:creationId xmlns:a16="http://schemas.microsoft.com/office/drawing/2014/main" id="{EB3F573B-66AB-4BB7-BBE0-F758CDEF9BF9}"/>
+              </a:ext>
+            </a:extLst>
+          </p:cNvPr>
+          <p:cNvSpPr txBox="1"/>
+          <p:nvPr/>
+        </p:nvSpPr>
+        <p:spPr>
+          <a:xfrm>
+            <a:off x="6269259" y="4327526"/>
+            <a:ext cx="4142792" cy="523220"/>
+          </a:xfrm>
+          <a:prstGeom prst="rect">
+            <a:avLst/>
+          </a:prstGeom>
+          <a:noFill/>
+        </p:spPr>
+        <p:txBody>
+          <a:bodyPr wrap="square" rtlCol="0">
+            <a:spAutoFit/>
+          </a:bodyPr>
+          <a:lstStyle/>
+          <a:p>
+            <a:pPr marL="285750" indent="-285750">
+              <a:buFont typeface="Arial" panose="020B0604020202020204" pitchFamily="34" charset="0"/>
+              <a:buChar char="•"/>
+            </a:pPr>
+            <a:r>
+              <a:rPr lang="en-US" sz="1400" dirty="0"/>
+              <a:t>Add a “</a:t>
+            </a:r>
+            <a:r>
+              <a:rPr lang="en-US" sz="1400" b="1" dirty="0"/>
+              <a:t>Builds</a:t>
+            </a:r>
+            <a:r>
+              <a:rPr lang="en-US" sz="1400" dirty="0"/>
+              <a:t>” folder to the Root Directory for </a:t>
+            </a:r>
+          </a:p>
+          <a:p>
+            <a:pPr marL="742950" lvl="1" indent="-285750">
+              <a:buFont typeface="Arial" panose="020B0604020202020204" pitchFamily="34" charset="0"/>
+              <a:buChar char="•"/>
+            </a:pPr>
+            <a:endParaRPr lang="en-US" sz="1400" dirty="0"/>
+          </a:p>
+        </p:txBody>
+      </p:sp>
+      <p:pic>
+        <p:nvPicPr>
+          <p:cNvPr id="3" name="Picture 2" descr="A close up of a screen&#10;&#10;Description automatically generated">
+            <a:extLst>
+              <a:ext uri="{FF2B5EF4-FFF2-40B4-BE49-F238E27FC236}">
+                <a16:creationId xmlns:a16="http://schemas.microsoft.com/office/drawing/2014/main" id="{E91AB1AC-E469-411F-A952-565356573DB4}"/>
+              </a:ext>
+            </a:extLst>
+          </p:cNvPr>
+          <p:cNvPicPr>
+            <a:picLocks noChangeAspect="1"/>
+          </p:cNvPicPr>
+          <p:nvPr/>
+        </p:nvPicPr>
+        <p:blipFill>
+          <a:blip r:embed="rId4">
+            <a:extLst>
+              <a:ext uri="{28A0092B-C50C-407E-A947-70E740481C1C}">
+                <a14:useLocalDpi xmlns:a14="http://schemas.microsoft.com/office/drawing/2010/main" val="0"/>
+              </a:ext>
+            </a:extLst>
+          </a:blip>
+          <a:stretch>
+            <a:fillRect/>
+          </a:stretch>
+        </p:blipFill>
+        <p:spPr>
+          <a:xfrm>
+            <a:off x="859184" y="2590683"/>
+            <a:ext cx="5115639" cy="1676634"/>
+          </a:xfrm>
+          <a:prstGeom prst="rect">
+            <a:avLst/>
+          </a:prstGeom>
+        </p:spPr>
+      </p:pic>
+      <p:pic>
+        <p:nvPicPr>
+          <p:cNvPr id="5" name="Picture 4" descr="A close up of a screen&#10;&#10;Description automatically generated">
+            <a:extLst>
+              <a:ext uri="{FF2B5EF4-FFF2-40B4-BE49-F238E27FC236}">
+                <a16:creationId xmlns:a16="http://schemas.microsoft.com/office/drawing/2014/main" id="{F57034AA-7EA1-4F0A-92A4-1C091B7ADF8E}"/>
+              </a:ext>
+            </a:extLst>
+          </p:cNvPr>
+          <p:cNvPicPr>
+            <a:picLocks noChangeAspect="1"/>
+          </p:cNvPicPr>
+          <p:nvPr/>
+        </p:nvPicPr>
+        <p:blipFill>
+          <a:blip r:embed="rId5">
+            <a:extLst>
+              <a:ext uri="{28A0092B-C50C-407E-A947-70E740481C1C}">
+                <a14:useLocalDpi xmlns:a14="http://schemas.microsoft.com/office/drawing/2010/main" val="0"/>
+              </a:ext>
+            </a:extLst>
+          </a:blip>
+          <a:stretch>
+            <a:fillRect/>
+          </a:stretch>
+        </p:blipFill>
+        <p:spPr>
+          <a:xfrm>
+            <a:off x="6379449" y="2619262"/>
+            <a:ext cx="5106113" cy="1619476"/>
+          </a:xfrm>
+          <a:prstGeom prst="rect">
+            <a:avLst/>
+          </a:prstGeom>
+        </p:spPr>
+      </p:pic>
+      <p:sp>
+        <p:nvSpPr>
+          <p:cNvPr id="9" name="Arrow: Right 8">
+            <a:extLst>
+              <a:ext uri="{FF2B5EF4-FFF2-40B4-BE49-F238E27FC236}">
+                <a16:creationId xmlns:a16="http://schemas.microsoft.com/office/drawing/2014/main" id="{ECFBB475-1ACE-4AC7-B87D-2AFC93E4D4F1}"/>
+              </a:ext>
+            </a:extLst>
+          </p:cNvPr>
+          <p:cNvSpPr/>
+          <p:nvPr/>
+        </p:nvSpPr>
+        <p:spPr>
+          <a:xfrm>
+            <a:off x="5992537" y="3118629"/>
+            <a:ext cx="370835" cy="205274"/>
+          </a:xfrm>
+          <a:prstGeom prst="rightArrow">
+            <a:avLst/>
+          </a:prstGeom>
+        </p:spPr>
+        <p:style>
+          <a:lnRef idx="2">
+            <a:schemeClr val="accent2">
+              <a:shade val="50000"/>
+            </a:schemeClr>
+          </a:lnRef>
+          <a:fillRef idx="1">
+            <a:schemeClr val="accent2"/>
+          </a:fillRef>
+          <a:effectRef idx="0">
+            <a:schemeClr val="accent2"/>
+          </a:effectRef>
+          <a:fontRef idx="minor">
+            <a:schemeClr val="lt1"/>
+          </a:fontRef>
+        </p:style>
+        <p:txBody>
+          <a:bodyPr rtlCol="0" anchor="ctr"/>
+          <a:lstStyle/>
+          <a:p>
+            <a:pPr algn="ctr"/>
+            <a:endParaRPr lang="en-US"/>
+          </a:p>
+        </p:txBody>
+      </p:sp>
+    </p:spTree>
+    <p:extLst>
+      <p:ext uri="{BB962C8B-B14F-4D97-AF65-F5344CB8AC3E}">
+        <p14:creationId xmlns:p14="http://schemas.microsoft.com/office/powerpoint/2010/main" val="739594383"/>
+      </p:ext>
+    </p:extLst>
+  </p:cSld>
+  <p:clrMapOvr>
+    <a:masterClrMapping/>
+  </p:clrMapOvr>
+</p:sld>
+</file>
+
+<file path=ppt/slides/slide11.xml><?xml version="1.0" encoding="utf-8"?>
+<p:sld xmlns:a="http://schemas.openxmlformats.org/drawingml/2006/main" xmlns:r="http://schemas.openxmlformats.org/officeDocument/2006/relationships" xmlns:p="http://schemas.openxmlformats.org/presentationml/2006/main">
+  <p:cSld>
+    <p:bg>
+      <p:bgPr>
+        <a:solidFill>
+          <a:schemeClr val="bg1"/>
+        </a:solidFill>
+        <a:effectLst/>
+      </p:bgPr>
+    </p:bg>
+    <p:spTree>
+      <p:nvGrpSpPr>
+        <p:cNvPr id="1" name=""/>
+        <p:cNvGrpSpPr/>
+        <p:nvPr/>
+      </p:nvGrpSpPr>
+      <p:grpSpPr>
+        <a:xfrm>
+          <a:off x="0" y="0"/>
+          <a:ext cx="0" cy="0"/>
+          <a:chOff x="0" y="0"/>
+          <a:chExt cx="0" cy="0"/>
+        </a:xfrm>
+      </p:grpSpPr>
+      <p:sp useBgFill="1">
+        <p:nvSpPr>
+          <p:cNvPr id="8" name="Rectangle 7">
+            <a:extLst>
+              <a:ext uri="{FF2B5EF4-FFF2-40B4-BE49-F238E27FC236}">
+                <a16:creationId xmlns:a16="http://schemas.microsoft.com/office/drawing/2014/main" id="{DAF1966E-FD40-4A4A-B61B-C4DF7FA05F06}"/>
+              </a:ext>
+              <a:ext uri="{C183D7F6-B498-43B3-948B-1728B52AA6E4}">
+                <adec:decorative xmlns:adec="http://schemas.microsoft.com/office/drawing/2017/decorative" val="1"/>
+              </a:ext>
+            </a:extLst>
+          </p:cNvPr>
+          <p:cNvSpPr>
+            <a:spLocks noGrp="1" noRot="1" noChangeAspect="1" noMove="1" noResize="1" noEditPoints="1" noAdjustHandles="1" noChangeArrowheads="1" noChangeShapeType="1" noTextEdit="1"/>
+          </p:cNvSpPr>
+          <p:nvPr>
+            <p:extLst>
+              <p:ext uri="{386F3935-93C4-4BCD-93E2-E3B085C9AB24}">
+                <p16:designElem xmlns:p16="http://schemas.microsoft.com/office/powerpoint/2015/main" val="1"/>
+              </p:ext>
+            </p:extLst>
+          </p:nvPr>
+        </p:nvSpPr>
+        <p:spPr>
+          <a:xfrm>
+            <a:off x="0" y="0"/>
+            <a:ext cx="12192000" cy="6858000"/>
+          </a:xfrm>
+          <a:prstGeom prst="rect">
+            <a:avLst/>
+          </a:prstGeom>
+          <a:ln>
+            <a:noFill/>
+          </a:ln>
+        </p:spPr>
+        <p:style>
+          <a:lnRef idx="2">
+            <a:schemeClr val="accent1">
+              <a:shade val="50000"/>
+            </a:schemeClr>
+          </a:lnRef>
+          <a:fillRef idx="1">
+            <a:schemeClr val="accent1"/>
+          </a:fillRef>
+          <a:effectRef idx="0">
+            <a:schemeClr val="accent1"/>
+          </a:effectRef>
+          <a:fontRef idx="minor">
+            <a:schemeClr val="lt1"/>
+          </a:fontRef>
+        </p:style>
+        <p:txBody>
+          <a:bodyPr rtlCol="0" anchor="ctr"/>
+          <a:lstStyle/>
+          <a:p>
+            <a:pPr algn="ctr"/>
+            <a:endParaRPr lang="en-US"/>
+          </a:p>
+        </p:txBody>
+      </p:sp>
+      <p:pic>
+        <p:nvPicPr>
+          <p:cNvPr id="6" name="Picture 5" descr="A picture containing drawing, game&#10;&#10;Description automatically generated">
+            <a:extLst>
+              <a:ext uri="{FF2B5EF4-FFF2-40B4-BE49-F238E27FC236}">
+                <a16:creationId xmlns:a16="http://schemas.microsoft.com/office/drawing/2014/main" id="{02858255-85D6-4799-99D4-03800EC59C9A}"/>
+              </a:ext>
+            </a:extLst>
+          </p:cNvPr>
+          <p:cNvPicPr>
+            <a:picLocks noChangeAspect="1"/>
+          </p:cNvPicPr>
+          <p:nvPr/>
+        </p:nvPicPr>
+        <p:blipFill>
+          <a:blip r:embed="rId2">
+            <a:extLst>
+              <a:ext uri="{28A0092B-C50C-407E-A947-70E740481C1C}">
+                <a14:useLocalDpi xmlns:a14="http://schemas.microsoft.com/office/drawing/2010/main" val="0"/>
+              </a:ext>
+            </a:extLst>
+          </a:blip>
+          <a:stretch>
+            <a:fillRect/>
+          </a:stretch>
+        </p:blipFill>
+        <p:spPr>
+          <a:xfrm>
+            <a:off x="5187102" y="2886649"/>
+            <a:ext cx="6266667" cy="3228571"/>
+          </a:xfrm>
+          <a:prstGeom prst="rect">
+            <a:avLst/>
+          </a:prstGeom>
+        </p:spPr>
+      </p:pic>
+      <p:sp useBgFill="1">
+        <p:nvSpPr>
+          <p:cNvPr id="10" name="Rectangle 9">
+            <a:extLst>
+              <a:ext uri="{FF2B5EF4-FFF2-40B4-BE49-F238E27FC236}">
+                <a16:creationId xmlns:a16="http://schemas.microsoft.com/office/drawing/2014/main" id="{047BFA19-D45E-416B-A404-7AF2F3F27017}"/>
+              </a:ext>
+              <a:ext uri="{C183D7F6-B498-43B3-948B-1728B52AA6E4}">
+                <adec:decorative xmlns:adec="http://schemas.microsoft.com/office/drawing/2017/decorative" val="1"/>
+              </a:ext>
+            </a:extLst>
+          </p:cNvPr>
+          <p:cNvSpPr>
+            <a:spLocks noGrp="1" noRot="1" noChangeAspect="1" noMove="1" noResize="1" noEditPoints="1" noAdjustHandles="1" noChangeArrowheads="1" noChangeShapeType="1" noTextEdit="1"/>
+          </p:cNvSpPr>
+          <p:nvPr>
+            <p:extLst>
+              <p:ext uri="{386F3935-93C4-4BCD-93E2-E3B085C9AB24}">
+                <p16:designElem xmlns:p16="http://schemas.microsoft.com/office/powerpoint/2015/main" val="1"/>
+              </p:ext>
+            </p:extLst>
+          </p:nvPr>
+        </p:nvSpPr>
+        <p:spPr>
+          <a:xfrm>
+            <a:off x="558209" y="0"/>
+            <a:ext cx="11167447" cy="2018806"/>
+          </a:xfrm>
+          <a:prstGeom prst="rect">
+            <a:avLst/>
+          </a:prstGeom>
+          <a:ln w="9525">
+            <a:solidFill>
+              <a:srgbClr val="E1E1E1"/>
+            </a:solidFill>
+          </a:ln>
+          <a:effectLst>
+            <a:outerShdw blurRad="50800" dist="38100" dir="2700000" algn="tl" rotWithShape="0">
+              <a:schemeClr val="bg1">
+                <a:lumMod val="85000"/>
+                <a:alpha val="50000"/>
+              </a:schemeClr>
+            </a:outerShdw>
+          </a:effectLst>
+        </p:spPr>
+        <p:style>
+          <a:lnRef idx="2">
+            <a:schemeClr val="accent1">
+              <a:shade val="50000"/>
+            </a:schemeClr>
+          </a:lnRef>
+          <a:fillRef idx="1">
+            <a:schemeClr val="accent1"/>
+          </a:fillRef>
+          <a:effectRef idx="0">
+            <a:schemeClr val="accent1"/>
+          </a:effectRef>
+          <a:fontRef idx="minor">
+            <a:schemeClr val="lt1"/>
+          </a:fontRef>
+        </p:style>
+        <p:txBody>
+          <a:bodyPr rtlCol="0" anchor="ctr"/>
+          <a:lstStyle/>
+          <a:p>
+            <a:pPr marL="0" marR="0" lvl="0" indent="0" algn="ctr" defTabSz="914400" rtl="0" eaLnBrk="1" fontAlgn="auto" latinLnBrk="0" hangingPunct="1">
+              <a:lnSpc>
+                <a:spcPct val="100000"/>
+              </a:lnSpc>
+              <a:spcBef>
+                <a:spcPts val="0"/>
+              </a:spcBef>
+              <a:spcAft>
+                <a:spcPts val="0"/>
+              </a:spcAft>
+              <a:buClrTx/>
+              <a:buSzTx/>
+              <a:buFontTx/>
+              <a:buNone/>
+              <a:tabLst/>
+              <a:defRPr/>
+            </a:pPr>
+            <a:endParaRPr kumimoji="0" lang="en-US" sz="1800" b="0" i="0" u="none" strike="noStrike" kern="1200" cap="none" spc="0" normalizeH="0" baseline="0" noProof="0">
+              <a:ln>
+                <a:noFill/>
+              </a:ln>
+              <a:solidFill>
+                <a:prstClr val="white"/>
+              </a:solidFill>
+              <a:effectLst/>
+              <a:uLnTx/>
+              <a:uFillTx/>
+              <a:latin typeface="Calibri" panose="020F0502020204030204"/>
+              <a:ea typeface="+mn-ea"/>
+              <a:cs typeface="+mn-cs"/>
+            </a:endParaRPr>
+          </a:p>
+        </p:txBody>
+      </p:sp>
+      <p:sp useBgFill="1">
+        <p:nvSpPr>
+          <p:cNvPr id="12" name="Rectangle 11">
+            <a:extLst>
+              <a:ext uri="{FF2B5EF4-FFF2-40B4-BE49-F238E27FC236}">
+                <a16:creationId xmlns:a16="http://schemas.microsoft.com/office/drawing/2014/main" id="{8E0105E7-23DB-4CF2-8258-FF47C7620F6E}"/>
+              </a:ext>
+              <a:ext uri="{C183D7F6-B498-43B3-948B-1728B52AA6E4}">
+                <adec:decorative xmlns:adec="http://schemas.microsoft.com/office/drawing/2017/decorative" val="1"/>
+              </a:ext>
+            </a:extLst>
+          </p:cNvPr>
+          <p:cNvSpPr>
+            <a:spLocks noGrp="1" noRot="1" noChangeAspect="1" noMove="1" noResize="1" noEditPoints="1" noAdjustHandles="1" noChangeArrowheads="1" noChangeShapeType="1" noTextEdit="1"/>
+          </p:cNvSpPr>
+          <p:nvPr>
+            <p:extLst>
+              <p:ext uri="{386F3935-93C4-4BCD-93E2-E3B085C9AB24}">
+                <p16:designElem xmlns:p16="http://schemas.microsoft.com/office/powerpoint/2015/main" val="1"/>
+              </p:ext>
+            </p:extLst>
+          </p:nvPr>
+        </p:nvSpPr>
+        <p:spPr>
+          <a:xfrm>
+            <a:off x="566928" y="0"/>
+            <a:ext cx="11155680" cy="2011680"/>
+          </a:xfrm>
+          <a:prstGeom prst="rect">
+            <a:avLst/>
+          </a:prstGeom>
+          <a:ln w="9525">
+            <a:noFill/>
+          </a:ln>
+          <a:effectLst/>
+        </p:spPr>
+        <p:style>
+          <a:lnRef idx="2">
+            <a:schemeClr val="accent1">
+              <a:shade val="50000"/>
+            </a:schemeClr>
+          </a:lnRef>
+          <a:fillRef idx="1">
+            <a:schemeClr val="accent1"/>
+          </a:fillRef>
+          <a:effectRef idx="0">
+            <a:schemeClr val="accent1"/>
+          </a:effectRef>
+          <a:fontRef idx="minor">
+            <a:schemeClr val="lt1"/>
+          </a:fontRef>
+        </p:style>
+        <p:txBody>
+          <a:bodyPr rtlCol="0" anchor="ctr"/>
+          <a:lstStyle/>
+          <a:p>
+            <a:pPr marL="0" marR="0" lvl="0" indent="0" algn="ctr" defTabSz="914400" rtl="0" eaLnBrk="1" fontAlgn="auto" latinLnBrk="0" hangingPunct="1">
+              <a:lnSpc>
+                <a:spcPct val="100000"/>
+              </a:lnSpc>
+              <a:spcBef>
+                <a:spcPts val="0"/>
+              </a:spcBef>
+              <a:spcAft>
+                <a:spcPts val="0"/>
+              </a:spcAft>
+              <a:buClrTx/>
+              <a:buSzTx/>
+              <a:buFontTx/>
+              <a:buNone/>
+              <a:tabLst/>
+              <a:defRPr/>
+            </a:pPr>
+            <a:endParaRPr kumimoji="0" lang="en-US" sz="1800" b="0" i="0" u="none" strike="noStrike" kern="1200" cap="none" spc="0" normalizeH="0" baseline="0" noProof="0">
+              <a:ln>
+                <a:noFill/>
+              </a:ln>
+              <a:solidFill>
+                <a:prstClr val="white"/>
+              </a:solidFill>
+              <a:effectLst/>
+              <a:uLnTx/>
+              <a:uFillTx/>
+              <a:latin typeface="Calibri" panose="020F0502020204030204"/>
+              <a:ea typeface="+mn-ea"/>
+              <a:cs typeface="+mn-cs"/>
+            </a:endParaRPr>
+          </a:p>
+        </p:txBody>
+      </p:sp>
+      <p:sp>
+        <p:nvSpPr>
+          <p:cNvPr id="14" name="Rectangle 13">
+            <a:extLst>
+              <a:ext uri="{FF2B5EF4-FFF2-40B4-BE49-F238E27FC236}">
+                <a16:creationId xmlns:a16="http://schemas.microsoft.com/office/drawing/2014/main" id="{074B4F7D-14B2-478B-8BF5-01E4E0C5D263}"/>
+              </a:ext>
+              <a:ext uri="{C183D7F6-B498-43B3-948B-1728B52AA6E4}">
+                <adec:decorative xmlns:adec="http://schemas.microsoft.com/office/drawing/2017/decorative" val="1"/>
+              </a:ext>
+            </a:extLst>
+          </p:cNvPr>
+          <p:cNvSpPr>
+            <a:spLocks noGrp="1" noRot="1" noChangeAspect="1" noMove="1" noResize="1" noEditPoints="1" noAdjustHandles="1" noChangeArrowheads="1" noChangeShapeType="1" noTextEdit="1"/>
+          </p:cNvSpPr>
+          <p:nvPr>
+            <p:extLst>
+              <p:ext uri="{386F3935-93C4-4BCD-93E2-E3B085C9AB24}">
+                <p16:designElem xmlns:p16="http://schemas.microsoft.com/office/powerpoint/2015/main" val="1"/>
+              </p:ext>
+            </p:extLst>
+          </p:nvPr>
+        </p:nvSpPr>
+        <p:spPr>
+          <a:xfrm>
+            <a:off x="498834" y="758952"/>
+            <a:ext cx="128016" cy="704088"/>
+          </a:xfrm>
+          <a:prstGeom prst="rect">
+            <a:avLst/>
+          </a:prstGeom>
+          <a:solidFill>
+            <a:schemeClr val="accent2"/>
+          </a:solidFill>
+          <a:ln>
+            <a:noFill/>
+          </a:ln>
+        </p:spPr>
+        <p:style>
+          <a:lnRef idx="2">
+            <a:schemeClr val="accent1">
+              <a:shade val="50000"/>
+            </a:schemeClr>
+          </a:lnRef>
+          <a:fillRef idx="1">
+            <a:schemeClr val="accent1"/>
+          </a:fillRef>
+          <a:effectRef idx="0">
+            <a:schemeClr val="accent1"/>
+          </a:effectRef>
+          <a:fontRef idx="minor">
+            <a:schemeClr val="lt1"/>
+          </a:fontRef>
+        </p:style>
+        <p:txBody>
+          <a:bodyPr rtlCol="0" anchor="ctr"/>
+          <a:lstStyle/>
+          <a:p>
+            <a:pPr algn="ctr"/>
+            <a:endParaRPr lang="en-US">
+              <a:solidFill>
+                <a:prstClr val="white"/>
+              </a:solidFill>
+              <a:latin typeface="Calibri" panose="020F0502020204030204"/>
+            </a:endParaRPr>
+          </a:p>
+        </p:txBody>
+      </p:sp>
+      <p:sp>
+        <p:nvSpPr>
+          <p:cNvPr id="16" name="Title 1">
+            <a:extLst>
+              <a:ext uri="{FF2B5EF4-FFF2-40B4-BE49-F238E27FC236}">
+                <a16:creationId xmlns:a16="http://schemas.microsoft.com/office/drawing/2014/main" id="{C83D6A4E-8F21-43C5-B459-0611CB001524}"/>
+              </a:ext>
+            </a:extLst>
+          </p:cNvPr>
+          <p:cNvSpPr>
+            <a:spLocks noGrp="1"/>
+          </p:cNvSpPr>
+          <p:nvPr>
+            <p:ph type="title"/>
+          </p:nvPr>
+        </p:nvSpPr>
+        <p:spPr>
+          <a:xfrm>
+            <a:off x="2549932" y="548640"/>
+            <a:ext cx="8733763" cy="1179576"/>
+          </a:xfrm>
+        </p:spPr>
+        <p:txBody>
+          <a:bodyPr>
+            <a:normAutofit/>
+          </a:bodyPr>
+          <a:lstStyle/>
+          <a:p>
+            <a:r>
+              <a:rPr lang="en-US" sz="4000" dirty="0"/>
+              <a:t>UI/UX Best Practices (Games)</a:t>
+            </a:r>
+          </a:p>
+        </p:txBody>
+      </p:sp>
+      <p:sp>
+        <p:nvSpPr>
+          <p:cNvPr id="13" name="Rectangle 12" descr="Smart Phone">
+            <a:extLst>
+              <a:ext uri="{FF2B5EF4-FFF2-40B4-BE49-F238E27FC236}">
+                <a16:creationId xmlns:a16="http://schemas.microsoft.com/office/drawing/2014/main" id="{E87100C8-6599-45F4-9770-31D2BE8527E8}"/>
+              </a:ext>
+            </a:extLst>
+          </p:cNvPr>
+          <p:cNvSpPr/>
+          <p:nvPr/>
+        </p:nvSpPr>
+        <p:spPr>
+          <a:xfrm>
+            <a:off x="908303" y="446343"/>
+            <a:ext cx="1314779" cy="1314779"/>
+          </a:xfrm>
+          <a:prstGeom prst="rect">
+            <a:avLst/>
+          </a:prstGeom>
+          <a:blipFill>
+            <a:blip r:embed="rId3">
+              <a:extLst>
+                <a:ext uri="{28A0092B-C50C-407E-A947-70E740481C1C}">
+                  <a14:useLocalDpi xmlns:a14="http://schemas.microsoft.com/office/drawing/2010/main" val="0"/>
+                </a:ext>
+                <a:ext uri="{96DAC541-7B7A-43D3-8B79-37D633B846F1}">
+                  <asvg:svgBlip xmlns:asvg="http://schemas.microsoft.com/office/drawing/2016/SVG/main" r:embed="rId4"/>
+                </a:ext>
+              </a:extLst>
+            </a:blip>
+            <a:stretch>
+              <a:fillRect/>
+            </a:stretch>
+          </a:blipFill>
+          <a:ln>
+            <a:noFill/>
+          </a:ln>
+        </p:spPr>
+        <p:style>
+          <a:lnRef idx="2">
+            <a:scrgbClr r="0" g="0" b="0"/>
+          </a:lnRef>
+          <a:fillRef idx="1">
+            <a:scrgbClr r="0" g="0" b="0"/>
+          </a:fillRef>
+          <a:effectRef idx="0">
+            <a:schemeClr val="accent3">
+              <a:hueOff val="0"/>
+              <a:satOff val="0"/>
+              <a:lumOff val="0"/>
+              <a:alphaOff val="0"/>
+            </a:schemeClr>
+          </a:effectRef>
+          <a:fontRef idx="minor">
+            <a:schemeClr val="lt1"/>
+          </a:fontRef>
+        </p:style>
+      </p:sp>
+      <p:sp>
+        <p:nvSpPr>
+          <p:cNvPr id="20" name="TextBox 19">
+            <a:extLst>
+              <a:ext uri="{FF2B5EF4-FFF2-40B4-BE49-F238E27FC236}">
+                <a16:creationId xmlns:a16="http://schemas.microsoft.com/office/drawing/2014/main" id="{9E38DAAA-7FA9-4A63-B74B-CA623D1FEE85}"/>
+              </a:ext>
+            </a:extLst>
+          </p:cNvPr>
+          <p:cNvSpPr txBox="1"/>
+          <p:nvPr/>
+        </p:nvSpPr>
+        <p:spPr>
+          <a:xfrm>
+            <a:off x="9965093" y="6405810"/>
+            <a:ext cx="2131831" cy="307777"/>
+          </a:xfrm>
+          <a:prstGeom prst="rect">
+            <a:avLst/>
+          </a:prstGeom>
+          <a:noFill/>
+        </p:spPr>
+        <p:txBody>
+          <a:bodyPr wrap="square" rtlCol="0">
+            <a:spAutoFit/>
+          </a:bodyPr>
+          <a:lstStyle/>
+          <a:p>
+            <a:pPr>
+              <a:spcAft>
+                <a:spcPts val="600"/>
+              </a:spcAft>
+            </a:pPr>
+            <a:r>
+              <a:rPr lang="en-US" sz="1400" dirty="0"/>
+              <a:t>[10] </a:t>
+            </a:r>
+            <a:r>
+              <a:rPr lang="en-US" sz="1400" dirty="0" err="1">
+                <a:solidFill>
+                  <a:srgbClr val="000000"/>
+                </a:solidFill>
+                <a:hlinkClick r:id="rId5"/>
+              </a:rPr>
+              <a:t>TouchSwipe</a:t>
+            </a:r>
+            <a:endParaRPr lang="en-US" sz="1400" dirty="0">
+              <a:solidFill>
+                <a:srgbClr val="000000"/>
+              </a:solidFill>
+            </a:endParaRPr>
+          </a:p>
+        </p:txBody>
+      </p:sp>
+      <p:sp>
+        <p:nvSpPr>
+          <p:cNvPr id="2" name="TextBox 1">
+            <a:extLst>
+              <a:ext uri="{FF2B5EF4-FFF2-40B4-BE49-F238E27FC236}">
+                <a16:creationId xmlns:a16="http://schemas.microsoft.com/office/drawing/2014/main" id="{4C6AC14F-1142-4603-955E-562B1B73FA34}"/>
+              </a:ext>
+            </a:extLst>
+          </p:cNvPr>
+          <p:cNvSpPr txBox="1"/>
+          <p:nvPr/>
+        </p:nvSpPr>
+        <p:spPr>
+          <a:xfrm>
+            <a:off x="738231" y="2390862"/>
+            <a:ext cx="6174297" cy="923330"/>
+          </a:xfrm>
+          <a:prstGeom prst="rect">
+            <a:avLst/>
+          </a:prstGeom>
+          <a:noFill/>
+        </p:spPr>
+        <p:txBody>
+          <a:bodyPr wrap="square" rtlCol="0">
+            <a:spAutoFit/>
+          </a:bodyPr>
+          <a:lstStyle/>
+          <a:p>
+            <a:pPr marL="285750" indent="-285750">
+              <a:buFont typeface="Arial" panose="020B0604020202020204" pitchFamily="34" charset="0"/>
+              <a:buChar char="•"/>
+            </a:pPr>
+            <a:r>
+              <a:rPr lang="en-US" dirty="0"/>
+              <a:t>Finger-Sized Elements</a:t>
+            </a:r>
+          </a:p>
+          <a:p>
+            <a:pPr marL="285750" indent="-285750">
+              <a:buFont typeface="Arial" panose="020B0604020202020204" pitchFamily="34" charset="0"/>
+              <a:buChar char="•"/>
+            </a:pPr>
+            <a:r>
+              <a:rPr lang="en-US" dirty="0"/>
+              <a:t>Avoid Clutter</a:t>
+            </a:r>
+          </a:p>
+          <a:p>
+            <a:pPr marL="285750" indent="-285750">
+              <a:buFont typeface="Arial" panose="020B0604020202020204" pitchFamily="34" charset="0"/>
+              <a:buChar char="•"/>
+            </a:pPr>
+            <a:r>
+              <a:rPr lang="en-US" dirty="0"/>
+              <a:t>Swipe Space</a:t>
+            </a:r>
+          </a:p>
+        </p:txBody>
+      </p:sp>
+      <p:pic>
+        <p:nvPicPr>
+          <p:cNvPr id="15" name="Picture 14" descr="A picture containing drawing&#10;&#10;Description automatically generated">
+            <a:extLst>
+              <a:ext uri="{FF2B5EF4-FFF2-40B4-BE49-F238E27FC236}">
+                <a16:creationId xmlns:a16="http://schemas.microsoft.com/office/drawing/2014/main" id="{8FDF10B5-559B-4ED6-A744-D4FA54CC2A6D}"/>
+              </a:ext>
+            </a:extLst>
+          </p:cNvPr>
+          <p:cNvPicPr>
+            <a:picLocks noChangeAspect="1"/>
+          </p:cNvPicPr>
+          <p:nvPr/>
+        </p:nvPicPr>
+        <p:blipFill>
+          <a:blip r:embed="rId6">
+            <a:extLst>
+              <a:ext uri="{28A0092B-C50C-407E-A947-70E740481C1C}">
+                <a14:useLocalDpi xmlns:a14="http://schemas.microsoft.com/office/drawing/2010/main" val="0"/>
+              </a:ext>
+            </a:extLst>
+          </a:blip>
+          <a:stretch>
+            <a:fillRect/>
+          </a:stretch>
+        </p:blipFill>
+        <p:spPr>
+          <a:xfrm>
+            <a:off x="1312987" y="4021028"/>
+            <a:ext cx="3571961" cy="2084660"/>
+          </a:xfrm>
+          <a:prstGeom prst="rect">
+            <a:avLst/>
+          </a:prstGeom>
+        </p:spPr>
+      </p:pic>
+    </p:spTree>
+    <p:extLst>
+      <p:ext uri="{BB962C8B-B14F-4D97-AF65-F5344CB8AC3E}">
+        <p14:creationId xmlns:p14="http://schemas.microsoft.com/office/powerpoint/2010/main" val="1926514470"/>
+      </p:ext>
+    </p:extLst>
+  </p:cSld>
+  <p:clrMapOvr>
+    <a:masterClrMapping/>
+  </p:clrMapOvr>
+</p:sld>
+</file>
+
+<file path=ppt/slides/slide12.xml><?xml version="1.0" encoding="utf-8"?>
+<p:sld xmlns:a="http://schemas.openxmlformats.org/drawingml/2006/main" xmlns:r="http://schemas.openxmlformats.org/officeDocument/2006/relationships" xmlns:p="http://schemas.openxmlformats.org/presentationml/2006/main">
+  <p:cSld>
+    <p:bg>
+      <p:bgPr>
+        <a:solidFill>
+          <a:schemeClr val="bg1"/>
+        </a:solidFill>
+        <a:effectLst/>
+      </p:bgPr>
+    </p:bg>
+    <p:spTree>
+      <p:nvGrpSpPr>
+        <p:cNvPr id="1" name=""/>
+        <p:cNvGrpSpPr/>
+        <p:nvPr/>
+      </p:nvGrpSpPr>
+      <p:grpSpPr>
+        <a:xfrm>
+          <a:off x="0" y="0"/>
+          <a:ext cx="0" cy="0"/>
+          <a:chOff x="0" y="0"/>
+          <a:chExt cx="0" cy="0"/>
+        </a:xfrm>
+      </p:grpSpPr>
+      <p:sp useBgFill="1">
+        <p:nvSpPr>
+          <p:cNvPr id="8" name="Rectangle 7">
+            <a:extLst>
+              <a:ext uri="{FF2B5EF4-FFF2-40B4-BE49-F238E27FC236}">
+                <a16:creationId xmlns:a16="http://schemas.microsoft.com/office/drawing/2014/main" id="{DAF1966E-FD40-4A4A-B61B-C4DF7FA05F06}"/>
+              </a:ext>
+              <a:ext uri="{C183D7F6-B498-43B3-948B-1728B52AA6E4}">
+                <adec:decorative xmlns:adec="http://schemas.microsoft.com/office/drawing/2017/decorative" val="1"/>
+              </a:ext>
+            </a:extLst>
+          </p:cNvPr>
+          <p:cNvSpPr>
+            <a:spLocks noGrp="1" noRot="1" noChangeAspect="1" noMove="1" noResize="1" noEditPoints="1" noAdjustHandles="1" noChangeArrowheads="1" noChangeShapeType="1" noTextEdit="1"/>
+          </p:cNvSpPr>
+          <p:nvPr>
+            <p:extLst>
+              <p:ext uri="{386F3935-93C4-4BCD-93E2-E3B085C9AB24}">
+                <p16:designElem xmlns:p16="http://schemas.microsoft.com/office/powerpoint/2015/main" val="1"/>
+              </p:ext>
+            </p:extLst>
+          </p:nvPr>
+        </p:nvSpPr>
+        <p:spPr>
+          <a:xfrm>
+            <a:off x="0" y="0"/>
+            <a:ext cx="12192000" cy="6858000"/>
+          </a:xfrm>
+          <a:prstGeom prst="rect">
+            <a:avLst/>
+          </a:prstGeom>
+          <a:ln>
+            <a:noFill/>
+          </a:ln>
+        </p:spPr>
+        <p:style>
+          <a:lnRef idx="2">
+            <a:schemeClr val="accent1">
+              <a:shade val="50000"/>
+            </a:schemeClr>
+          </a:lnRef>
+          <a:fillRef idx="1">
+            <a:schemeClr val="accent1"/>
+          </a:fillRef>
+          <a:effectRef idx="0">
+            <a:schemeClr val="accent1"/>
+          </a:effectRef>
+          <a:fontRef idx="minor">
+            <a:schemeClr val="lt1"/>
+          </a:fontRef>
+        </p:style>
+        <p:txBody>
+          <a:bodyPr rtlCol="0" anchor="ctr"/>
+          <a:lstStyle/>
+          <a:p>
+            <a:pPr algn="ctr"/>
+            <a:endParaRPr lang="en-US"/>
+          </a:p>
+        </p:txBody>
+      </p:sp>
+      <p:sp useBgFill="1">
+        <p:nvSpPr>
+          <p:cNvPr id="10" name="Rectangle 9">
+            <a:extLst>
+              <a:ext uri="{FF2B5EF4-FFF2-40B4-BE49-F238E27FC236}">
+                <a16:creationId xmlns:a16="http://schemas.microsoft.com/office/drawing/2014/main" id="{047BFA19-D45E-416B-A404-7AF2F3F27017}"/>
+              </a:ext>
+              <a:ext uri="{C183D7F6-B498-43B3-948B-1728B52AA6E4}">
+                <adec:decorative xmlns:adec="http://schemas.microsoft.com/office/drawing/2017/decorative" val="1"/>
+              </a:ext>
+            </a:extLst>
+          </p:cNvPr>
+          <p:cNvSpPr>
+            <a:spLocks noGrp="1" noRot="1" noChangeAspect="1" noMove="1" noResize="1" noEditPoints="1" noAdjustHandles="1" noChangeArrowheads="1" noChangeShapeType="1" noTextEdit="1"/>
+          </p:cNvSpPr>
+          <p:nvPr>
+            <p:extLst>
+              <p:ext uri="{386F3935-93C4-4BCD-93E2-E3B085C9AB24}">
+                <p16:designElem xmlns:p16="http://schemas.microsoft.com/office/powerpoint/2015/main" val="1"/>
+              </p:ext>
+            </p:extLst>
+          </p:nvPr>
+        </p:nvSpPr>
+        <p:spPr>
+          <a:xfrm>
+            <a:off x="558209" y="0"/>
+            <a:ext cx="11167447" cy="2018806"/>
+          </a:xfrm>
+          <a:prstGeom prst="rect">
+            <a:avLst/>
+          </a:prstGeom>
+          <a:ln w="9525">
+            <a:solidFill>
+              <a:srgbClr val="E1E1E1"/>
+            </a:solidFill>
+          </a:ln>
+          <a:effectLst>
+            <a:outerShdw blurRad="50800" dist="38100" dir="2700000" algn="tl" rotWithShape="0">
+              <a:schemeClr val="bg1">
+                <a:lumMod val="85000"/>
+                <a:alpha val="50000"/>
+              </a:schemeClr>
+            </a:outerShdw>
+          </a:effectLst>
+        </p:spPr>
+        <p:style>
+          <a:lnRef idx="2">
+            <a:schemeClr val="accent1">
+              <a:shade val="50000"/>
+            </a:schemeClr>
+          </a:lnRef>
+          <a:fillRef idx="1">
+            <a:schemeClr val="accent1"/>
+          </a:fillRef>
+          <a:effectRef idx="0">
+            <a:schemeClr val="accent1"/>
+          </a:effectRef>
+          <a:fontRef idx="minor">
+            <a:schemeClr val="lt1"/>
+          </a:fontRef>
+        </p:style>
+        <p:txBody>
+          <a:bodyPr rtlCol="0" anchor="ctr"/>
+          <a:lstStyle/>
+          <a:p>
+            <a:pPr marL="0" marR="0" lvl="0" indent="0" algn="ctr" defTabSz="914400" rtl="0" eaLnBrk="1" fontAlgn="auto" latinLnBrk="0" hangingPunct="1">
+              <a:lnSpc>
+                <a:spcPct val="100000"/>
+              </a:lnSpc>
+              <a:spcBef>
+                <a:spcPts val="0"/>
+              </a:spcBef>
+              <a:spcAft>
+                <a:spcPts val="0"/>
+              </a:spcAft>
+              <a:buClrTx/>
+              <a:buSzTx/>
+              <a:buFontTx/>
+              <a:buNone/>
+              <a:tabLst/>
+              <a:defRPr/>
+            </a:pPr>
+            <a:endParaRPr kumimoji="0" lang="en-US" sz="1800" b="0" i="0" u="none" strike="noStrike" kern="1200" cap="none" spc="0" normalizeH="0" baseline="0" noProof="0">
+              <a:ln>
+                <a:noFill/>
+              </a:ln>
+              <a:solidFill>
+                <a:prstClr val="white"/>
+              </a:solidFill>
+              <a:effectLst/>
+              <a:uLnTx/>
+              <a:uFillTx/>
+              <a:latin typeface="Calibri" panose="020F0502020204030204"/>
+              <a:ea typeface="+mn-ea"/>
+              <a:cs typeface="+mn-cs"/>
+            </a:endParaRPr>
+          </a:p>
+        </p:txBody>
+      </p:sp>
+      <p:sp useBgFill="1">
+        <p:nvSpPr>
+          <p:cNvPr id="12" name="Rectangle 11">
+            <a:extLst>
+              <a:ext uri="{FF2B5EF4-FFF2-40B4-BE49-F238E27FC236}">
+                <a16:creationId xmlns:a16="http://schemas.microsoft.com/office/drawing/2014/main" id="{8E0105E7-23DB-4CF2-8258-FF47C7620F6E}"/>
+              </a:ext>
+              <a:ext uri="{C183D7F6-B498-43B3-948B-1728B52AA6E4}">
+                <adec:decorative xmlns:adec="http://schemas.microsoft.com/office/drawing/2017/decorative" val="1"/>
+              </a:ext>
+            </a:extLst>
+          </p:cNvPr>
+          <p:cNvSpPr>
+            <a:spLocks noGrp="1" noRot="1" noChangeAspect="1" noMove="1" noResize="1" noEditPoints="1" noAdjustHandles="1" noChangeArrowheads="1" noChangeShapeType="1" noTextEdit="1"/>
+          </p:cNvSpPr>
+          <p:nvPr>
+            <p:extLst>
+              <p:ext uri="{386F3935-93C4-4BCD-93E2-E3B085C9AB24}">
+                <p16:designElem xmlns:p16="http://schemas.microsoft.com/office/powerpoint/2015/main" val="1"/>
+              </p:ext>
+            </p:extLst>
+          </p:nvPr>
+        </p:nvSpPr>
+        <p:spPr>
+          <a:xfrm>
+            <a:off x="566928" y="0"/>
+            <a:ext cx="11155680" cy="2011680"/>
+          </a:xfrm>
+          <a:prstGeom prst="rect">
+            <a:avLst/>
+          </a:prstGeom>
+          <a:ln w="9525">
+            <a:noFill/>
+          </a:ln>
+          <a:effectLst/>
+        </p:spPr>
+        <p:style>
+          <a:lnRef idx="2">
+            <a:schemeClr val="accent1">
+              <a:shade val="50000"/>
+            </a:schemeClr>
+          </a:lnRef>
+          <a:fillRef idx="1">
+            <a:schemeClr val="accent1"/>
+          </a:fillRef>
+          <a:effectRef idx="0">
+            <a:schemeClr val="accent1"/>
+          </a:effectRef>
+          <a:fontRef idx="minor">
+            <a:schemeClr val="lt1"/>
+          </a:fontRef>
+        </p:style>
+        <p:txBody>
+          <a:bodyPr rtlCol="0" anchor="ctr"/>
+          <a:lstStyle/>
+          <a:p>
+            <a:pPr marL="0" marR="0" lvl="0" indent="0" algn="ctr" defTabSz="914400" rtl="0" eaLnBrk="1" fontAlgn="auto" latinLnBrk="0" hangingPunct="1">
+              <a:lnSpc>
+                <a:spcPct val="100000"/>
+              </a:lnSpc>
+              <a:spcBef>
+                <a:spcPts val="0"/>
+              </a:spcBef>
+              <a:spcAft>
+                <a:spcPts val="0"/>
+              </a:spcAft>
+              <a:buClrTx/>
+              <a:buSzTx/>
+              <a:buFontTx/>
+              <a:buNone/>
+              <a:tabLst/>
+              <a:defRPr/>
+            </a:pPr>
+            <a:endParaRPr kumimoji="0" lang="en-US" sz="1800" b="0" i="0" u="none" strike="noStrike" kern="1200" cap="none" spc="0" normalizeH="0" baseline="0" noProof="0">
+              <a:ln>
+                <a:noFill/>
+              </a:ln>
+              <a:solidFill>
+                <a:prstClr val="white"/>
+              </a:solidFill>
+              <a:effectLst/>
+              <a:uLnTx/>
+              <a:uFillTx/>
+              <a:latin typeface="Calibri" panose="020F0502020204030204"/>
+              <a:ea typeface="+mn-ea"/>
+              <a:cs typeface="+mn-cs"/>
+            </a:endParaRPr>
+          </a:p>
+        </p:txBody>
+      </p:sp>
+      <p:sp>
+        <p:nvSpPr>
+          <p:cNvPr id="14" name="Rectangle 13">
+            <a:extLst>
+              <a:ext uri="{FF2B5EF4-FFF2-40B4-BE49-F238E27FC236}">
+                <a16:creationId xmlns:a16="http://schemas.microsoft.com/office/drawing/2014/main" id="{074B4F7D-14B2-478B-8BF5-01E4E0C5D263}"/>
+              </a:ext>
+              <a:ext uri="{C183D7F6-B498-43B3-948B-1728B52AA6E4}">
+                <adec:decorative xmlns:adec="http://schemas.microsoft.com/office/drawing/2017/decorative" val="1"/>
+              </a:ext>
+            </a:extLst>
+          </p:cNvPr>
+          <p:cNvSpPr>
+            <a:spLocks noGrp="1" noRot="1" noChangeAspect="1" noMove="1" noResize="1" noEditPoints="1" noAdjustHandles="1" noChangeArrowheads="1" noChangeShapeType="1" noTextEdit="1"/>
+          </p:cNvSpPr>
+          <p:nvPr>
+            <p:extLst>
+              <p:ext uri="{386F3935-93C4-4BCD-93E2-E3B085C9AB24}">
+                <p16:designElem xmlns:p16="http://schemas.microsoft.com/office/powerpoint/2015/main" val="1"/>
+              </p:ext>
+            </p:extLst>
+          </p:nvPr>
+        </p:nvSpPr>
+        <p:spPr>
+          <a:xfrm>
+            <a:off x="498834" y="758952"/>
+            <a:ext cx="128016" cy="704088"/>
+          </a:xfrm>
+          <a:prstGeom prst="rect">
+            <a:avLst/>
+          </a:prstGeom>
+          <a:solidFill>
+            <a:schemeClr val="accent2"/>
+          </a:solidFill>
+          <a:ln>
+            <a:noFill/>
+          </a:ln>
+        </p:spPr>
+        <p:style>
+          <a:lnRef idx="2">
+            <a:schemeClr val="accent1">
+              <a:shade val="50000"/>
+            </a:schemeClr>
+          </a:lnRef>
+          <a:fillRef idx="1">
+            <a:schemeClr val="accent1"/>
+          </a:fillRef>
+          <a:effectRef idx="0">
+            <a:schemeClr val="accent1"/>
+          </a:effectRef>
+          <a:fontRef idx="minor">
+            <a:schemeClr val="lt1"/>
+          </a:fontRef>
+        </p:style>
+        <p:txBody>
+          <a:bodyPr rtlCol="0" anchor="ctr"/>
+          <a:lstStyle/>
+          <a:p>
+            <a:pPr algn="ctr"/>
+            <a:endParaRPr lang="en-US">
+              <a:solidFill>
+                <a:prstClr val="white"/>
+              </a:solidFill>
+              <a:latin typeface="Calibri" panose="020F0502020204030204"/>
+            </a:endParaRPr>
+          </a:p>
+        </p:txBody>
+      </p:sp>
+      <p:sp>
+        <p:nvSpPr>
+          <p:cNvPr id="16" name="Title 1">
+            <a:extLst>
+              <a:ext uri="{FF2B5EF4-FFF2-40B4-BE49-F238E27FC236}">
+                <a16:creationId xmlns:a16="http://schemas.microsoft.com/office/drawing/2014/main" id="{C83D6A4E-8F21-43C5-B459-0611CB001524}"/>
+              </a:ext>
+            </a:extLst>
+          </p:cNvPr>
+          <p:cNvSpPr>
+            <a:spLocks noGrp="1"/>
+          </p:cNvSpPr>
+          <p:nvPr>
+            <p:ph type="title"/>
+          </p:nvPr>
+        </p:nvSpPr>
+        <p:spPr>
+          <a:xfrm>
+            <a:off x="2549932" y="548640"/>
+            <a:ext cx="8733763" cy="1179576"/>
+          </a:xfrm>
+        </p:spPr>
+        <p:txBody>
+          <a:bodyPr>
+            <a:normAutofit/>
+          </a:bodyPr>
+          <a:lstStyle/>
+          <a:p>
+            <a:r>
+              <a:rPr lang="en-US" sz="4000" dirty="0"/>
+              <a:t>Touchscreen Interactions</a:t>
+            </a:r>
+          </a:p>
+        </p:txBody>
+      </p:sp>
+      <p:sp>
+        <p:nvSpPr>
+          <p:cNvPr id="20" name="TextBox 19">
+            <a:extLst>
+              <a:ext uri="{FF2B5EF4-FFF2-40B4-BE49-F238E27FC236}">
+                <a16:creationId xmlns:a16="http://schemas.microsoft.com/office/drawing/2014/main" id="{9E38DAAA-7FA9-4A63-B74B-CA623D1FEE85}"/>
+              </a:ext>
+            </a:extLst>
+          </p:cNvPr>
+          <p:cNvSpPr txBox="1"/>
+          <p:nvPr/>
+        </p:nvSpPr>
+        <p:spPr>
+          <a:xfrm>
+            <a:off x="9199984" y="6405810"/>
+            <a:ext cx="2896940" cy="307777"/>
+          </a:xfrm>
+          <a:prstGeom prst="rect">
+            <a:avLst/>
+          </a:prstGeom>
+          <a:noFill/>
+        </p:spPr>
+        <p:txBody>
+          <a:bodyPr wrap="square" rtlCol="0">
+            <a:spAutoFit/>
+          </a:bodyPr>
+          <a:lstStyle/>
+          <a:p>
+            <a:pPr>
+              <a:spcAft>
+                <a:spcPts val="600"/>
+              </a:spcAft>
+            </a:pPr>
+            <a:r>
+              <a:rPr lang="en-US" sz="1400" dirty="0"/>
+              <a:t>[11] </a:t>
+            </a:r>
+            <a:r>
+              <a:rPr lang="en-US" sz="1400" dirty="0">
+                <a:solidFill>
+                  <a:srgbClr val="000000"/>
+                </a:solidFill>
+                <a:hlinkClick r:id="rId2"/>
+              </a:rPr>
+              <a:t>Touch Gestures</a:t>
+            </a:r>
+            <a:r>
+              <a:rPr lang="en-US" sz="1400" dirty="0">
+                <a:solidFill>
+                  <a:srgbClr val="000000"/>
+                </a:solidFill>
+              </a:rPr>
+              <a:t> [12] </a:t>
+            </a:r>
+            <a:r>
+              <a:rPr lang="en-US" sz="1400" dirty="0" err="1">
+                <a:solidFill>
+                  <a:srgbClr val="000000"/>
+                </a:solidFill>
+                <a:hlinkClick r:id="rId3"/>
+              </a:rPr>
+              <a:t>JoystickPack</a:t>
+            </a:r>
+            <a:endParaRPr lang="en-US" sz="1400" dirty="0">
+              <a:solidFill>
+                <a:srgbClr val="000000"/>
+              </a:solidFill>
+            </a:endParaRPr>
+          </a:p>
+        </p:txBody>
+      </p:sp>
+      <p:pic>
+        <p:nvPicPr>
+          <p:cNvPr id="3" name="Picture 2" descr="A close up of text on a white background&#10;&#10;Description automatically generated">
+            <a:extLst>
+              <a:ext uri="{FF2B5EF4-FFF2-40B4-BE49-F238E27FC236}">
+                <a16:creationId xmlns:a16="http://schemas.microsoft.com/office/drawing/2014/main" id="{A9BCB4C6-F16E-49E6-AA1D-ED7545EE5556}"/>
+              </a:ext>
+            </a:extLst>
+          </p:cNvPr>
+          <p:cNvPicPr>
+            <a:picLocks noChangeAspect="1"/>
+          </p:cNvPicPr>
+          <p:nvPr/>
+        </p:nvPicPr>
+        <p:blipFill>
+          <a:blip r:embed="rId4">
+            <a:extLst>
+              <a:ext uri="{28A0092B-C50C-407E-A947-70E740481C1C}">
+                <a14:useLocalDpi xmlns:a14="http://schemas.microsoft.com/office/drawing/2010/main" val="0"/>
+              </a:ext>
+            </a:extLst>
+          </a:blip>
+          <a:stretch>
+            <a:fillRect/>
+          </a:stretch>
+        </p:blipFill>
+        <p:spPr>
+          <a:xfrm>
+            <a:off x="1128020" y="2458023"/>
+            <a:ext cx="4328618" cy="3821289"/>
+          </a:xfrm>
+          <a:prstGeom prst="rect">
+            <a:avLst/>
+          </a:prstGeom>
+        </p:spPr>
+      </p:pic>
+      <p:pic>
+        <p:nvPicPr>
+          <p:cNvPr id="5" name="Picture 4" descr="A close up of a sign&#10;&#10;Description automatically generated">
+            <a:extLst>
+              <a:ext uri="{FF2B5EF4-FFF2-40B4-BE49-F238E27FC236}">
+                <a16:creationId xmlns:a16="http://schemas.microsoft.com/office/drawing/2014/main" id="{D519BBBC-6A7D-4390-B15B-40C8A4831884}"/>
+              </a:ext>
+            </a:extLst>
+          </p:cNvPr>
+          <p:cNvPicPr>
+            <a:picLocks noChangeAspect="1"/>
+          </p:cNvPicPr>
+          <p:nvPr/>
+        </p:nvPicPr>
+        <p:blipFill>
+          <a:blip r:embed="rId5">
+            <a:extLst>
+              <a:ext uri="{28A0092B-C50C-407E-A947-70E740481C1C}">
+                <a14:useLocalDpi xmlns:a14="http://schemas.microsoft.com/office/drawing/2010/main" val="0"/>
+              </a:ext>
+            </a:extLst>
+          </a:blip>
+          <a:stretch>
+            <a:fillRect/>
+          </a:stretch>
+        </p:blipFill>
+        <p:spPr>
+          <a:xfrm>
+            <a:off x="6163054" y="2458023"/>
+            <a:ext cx="4867954" cy="3667637"/>
+          </a:xfrm>
+          <a:prstGeom prst="rect">
+            <a:avLst/>
+          </a:prstGeom>
+        </p:spPr>
+      </p:pic>
+      <p:sp>
+        <p:nvSpPr>
+          <p:cNvPr id="9" name="Rectangle 8" descr="Document">
+            <a:extLst>
+              <a:ext uri="{FF2B5EF4-FFF2-40B4-BE49-F238E27FC236}">
+                <a16:creationId xmlns:a16="http://schemas.microsoft.com/office/drawing/2014/main" id="{AC528256-190B-4849-83F5-8B919289C577}"/>
+              </a:ext>
+            </a:extLst>
+          </p:cNvPr>
+          <p:cNvSpPr/>
+          <p:nvPr/>
+        </p:nvSpPr>
+        <p:spPr>
+          <a:xfrm>
+            <a:off x="783336" y="357772"/>
+            <a:ext cx="1300252" cy="1300252"/>
+          </a:xfrm>
+          <a:prstGeom prst="rect">
+            <a:avLst/>
+          </a:prstGeom>
+          <a:blipFill>
+            <a:blip r:embed="rId6">
+              <a:extLst>
+                <a:ext uri="{28A0092B-C50C-407E-A947-70E740481C1C}">
+                  <a14:useLocalDpi xmlns:a14="http://schemas.microsoft.com/office/drawing/2010/main" val="0"/>
+                </a:ext>
+                <a:ext uri="{96DAC541-7B7A-43D3-8B79-37D633B846F1}">
+                  <asvg:svgBlip xmlns:asvg="http://schemas.microsoft.com/office/drawing/2016/SVG/main" r:embed="rId7"/>
+                </a:ext>
+              </a:extLst>
+            </a:blip>
+            <a:stretch>
+              <a:fillRect/>
+            </a:stretch>
+          </a:blipFill>
+          <a:ln>
+            <a:noFill/>
+          </a:ln>
+        </p:spPr>
+        <p:style>
+          <a:lnRef idx="2">
+            <a:scrgbClr r="0" g="0" b="0"/>
+          </a:lnRef>
+          <a:fillRef idx="1">
+            <a:scrgbClr r="0" g="0" b="0"/>
+          </a:fillRef>
+          <a:effectRef idx="0">
+            <a:schemeClr val="accent4">
+              <a:hueOff val="0"/>
+              <a:satOff val="0"/>
+              <a:lumOff val="0"/>
+              <a:alphaOff val="0"/>
+            </a:schemeClr>
+          </a:effectRef>
+          <a:fontRef idx="minor">
+            <a:schemeClr val="lt1"/>
+          </a:fontRef>
+        </p:style>
+      </p:sp>
+    </p:spTree>
+    <p:extLst>
+      <p:ext uri="{BB962C8B-B14F-4D97-AF65-F5344CB8AC3E}">
+        <p14:creationId xmlns:p14="http://schemas.microsoft.com/office/powerpoint/2010/main" val="879826707"/>
+      </p:ext>
+    </p:extLst>
+  </p:cSld>
+  <p:clrMapOvr>
+    <a:masterClrMapping/>
+  </p:clrMapOvr>
+</p:sld>
+</file>
+
+<file path=ppt/slides/slide13.xml><?xml version="1.0" encoding="utf-8"?>
 <p:sld xmlns:a="http://schemas.openxmlformats.org/drawingml/2006/main" xmlns:r="http://schemas.openxmlformats.org/officeDocument/2006/relationships" xmlns:p="http://schemas.openxmlformats.org/presentationml/2006/main">
   <p:cSld>
     <p:bg>
@@ -14687,7 +16537,7 @@
 </p:sld>
 </file>
 
-<file path=ppt/slides/slide11.xml><?xml version="1.0" encoding="utf-8"?>
+<file path=ppt/slides/slide14.xml><?xml version="1.0" encoding="utf-8"?>
 <p:sld xmlns:a="http://schemas.openxmlformats.org/drawingml/2006/main" xmlns:r="http://schemas.openxmlformats.org/officeDocument/2006/relationships" xmlns:p="http://schemas.openxmlformats.org/presentationml/2006/main">
   <p:cSld>
     <p:bg>
@@ -15298,6 +17148,180 @@
 <file path=ppt/slides/slide2.xml><?xml version="1.0" encoding="utf-8"?>
 <p:sld xmlns:a="http://schemas.openxmlformats.org/drawingml/2006/main" xmlns:r="http://schemas.openxmlformats.org/officeDocument/2006/relationships" xmlns:p="http://schemas.openxmlformats.org/presentationml/2006/main">
   <p:cSld>
+    <p:spTree>
+      <p:nvGrpSpPr>
+        <p:cNvPr id="1" name=""/>
+        <p:cNvGrpSpPr/>
+        <p:nvPr/>
+      </p:nvGrpSpPr>
+      <p:grpSpPr>
+        <a:xfrm>
+          <a:off x="0" y="0"/>
+          <a:ext cx="0" cy="0"/>
+          <a:chOff x="0" y="0"/>
+          <a:chExt cx="0" cy="0"/>
+        </a:xfrm>
+      </p:grpSpPr>
+      <p:pic>
+        <p:nvPicPr>
+          <p:cNvPr id="5" name="Picture 4" descr="A picture containing text, refrigerator, old&#10;&#10;Description automatically generated">
+            <a:extLst>
+              <a:ext uri="{FF2B5EF4-FFF2-40B4-BE49-F238E27FC236}">
+                <a16:creationId xmlns:a16="http://schemas.microsoft.com/office/drawing/2014/main" id="{F1EEBAC1-1CE9-4899-A12C-8A0C1B2479D4}"/>
+              </a:ext>
+            </a:extLst>
+          </p:cNvPr>
+          <p:cNvPicPr>
+            <a:picLocks noChangeAspect="1"/>
+          </p:cNvPicPr>
+          <p:nvPr/>
+        </p:nvPicPr>
+        <p:blipFill>
+          <a:blip r:embed="rId2">
+            <a:extLst>
+              <a:ext uri="{28A0092B-C50C-407E-A947-70E740481C1C}">
+                <a14:useLocalDpi xmlns:a14="http://schemas.microsoft.com/office/drawing/2010/main" val="0"/>
+              </a:ext>
+            </a:extLst>
+          </a:blip>
+          <a:stretch>
+            <a:fillRect/>
+          </a:stretch>
+        </p:blipFill>
+        <p:spPr>
+          <a:xfrm>
+            <a:off x="1211511" y="973259"/>
+            <a:ext cx="4050954" cy="5483524"/>
+          </a:xfrm>
+          <a:prstGeom prst="rect">
+            <a:avLst/>
+          </a:prstGeom>
+        </p:spPr>
+      </p:pic>
+      <p:sp>
+        <p:nvSpPr>
+          <p:cNvPr id="7" name="TextBox 6">
+            <a:extLst>
+              <a:ext uri="{FF2B5EF4-FFF2-40B4-BE49-F238E27FC236}">
+                <a16:creationId xmlns:a16="http://schemas.microsoft.com/office/drawing/2014/main" id="{071278D0-C10A-4CD1-903C-B384F975F4D7}"/>
+              </a:ext>
+            </a:extLst>
+          </p:cNvPr>
+          <p:cNvSpPr txBox="1"/>
+          <p:nvPr/>
+        </p:nvSpPr>
+        <p:spPr>
+          <a:xfrm>
+            <a:off x="6563997" y="2843697"/>
+            <a:ext cx="3999028" cy="1297115"/>
+          </a:xfrm>
+          <a:prstGeom prst="rect">
+            <a:avLst/>
+          </a:prstGeom>
+        </p:spPr>
+        <p:txBody>
+          <a:bodyPr vert="horz" lIns="91440" tIns="45720" rIns="91440" bIns="45720" rtlCol="0" anchor="t">
+            <a:normAutofit/>
+          </a:bodyPr>
+          <a:lstStyle/>
+          <a:p>
+            <a:pPr>
+              <a:lnSpc>
+                <a:spcPct val="90000"/>
+              </a:lnSpc>
+              <a:spcBef>
+                <a:spcPct val="0"/>
+              </a:spcBef>
+              <a:spcAft>
+                <a:spcPts val="600"/>
+              </a:spcAft>
+            </a:pPr>
+            <a:r>
+              <a:rPr lang="en-US" sz="3200" i="1" dirty="0">
+                <a:solidFill>
+                  <a:srgbClr val="000000"/>
+                </a:solidFill>
+                <a:latin typeface="+mj-lt"/>
+                <a:ea typeface="+mj-ea"/>
+                <a:cs typeface="+mj-cs"/>
+              </a:rPr>
+              <a:t>Back in 1957</a:t>
+            </a:r>
+            <a:r>
+              <a:rPr lang="en-US" sz="3200" i="1" kern="1200" dirty="0">
+                <a:solidFill>
+                  <a:srgbClr val="000000"/>
+                </a:solidFill>
+                <a:latin typeface="+mj-lt"/>
+                <a:ea typeface="+mj-ea"/>
+                <a:cs typeface="+mj-cs"/>
+              </a:rPr>
+              <a:t>…</a:t>
+            </a:r>
+          </a:p>
+          <a:p>
+            <a:pPr>
+              <a:lnSpc>
+                <a:spcPct val="90000"/>
+              </a:lnSpc>
+              <a:spcBef>
+                <a:spcPct val="0"/>
+              </a:spcBef>
+              <a:spcAft>
+                <a:spcPts val="600"/>
+              </a:spcAft>
+            </a:pPr>
+            <a:endParaRPr lang="en-US" i="1" kern="1200" dirty="0">
+              <a:solidFill>
+                <a:srgbClr val="000000"/>
+              </a:solidFill>
+              <a:latin typeface="+mj-lt"/>
+              <a:ea typeface="+mj-ea"/>
+              <a:cs typeface="+mj-cs"/>
+            </a:endParaRPr>
+          </a:p>
+          <a:p>
+            <a:pPr>
+              <a:lnSpc>
+                <a:spcPct val="90000"/>
+              </a:lnSpc>
+              <a:spcBef>
+                <a:spcPct val="0"/>
+              </a:spcBef>
+              <a:spcAft>
+                <a:spcPts val="600"/>
+              </a:spcAft>
+            </a:pPr>
+            <a:r>
+              <a:rPr lang="en-US" i="1" kern="1200" dirty="0">
+                <a:solidFill>
+                  <a:srgbClr val="000000"/>
+                </a:solidFill>
+                <a:latin typeface="+mj-lt"/>
+                <a:ea typeface="+mj-ea"/>
+                <a:cs typeface="+mj-cs"/>
+              </a:rPr>
+              <a:t>Popularly considered the birthplace of VR.</a:t>
+            </a:r>
+          </a:p>
+        </p:txBody>
+      </p:sp>
+    </p:spTree>
+    <p:extLst>
+      <p:ext uri="{BB962C8B-B14F-4D97-AF65-F5344CB8AC3E}">
+        <p14:creationId xmlns:p14="http://schemas.microsoft.com/office/powerpoint/2010/main" val="97364465"/>
+      </p:ext>
+    </p:extLst>
+  </p:cSld>
+  <p:clrMapOvr>
+    <a:masterClrMapping/>
+  </p:clrMapOvr>
+</p:sld>
+</file>
+
+<file path=ppt/slides/slide3.xml><?xml version="1.0" encoding="utf-8"?>
+<p:sld xmlns:a="http://schemas.openxmlformats.org/drawingml/2006/main" xmlns:r="http://schemas.openxmlformats.org/officeDocument/2006/relationships" xmlns:p="http://schemas.openxmlformats.org/presentationml/2006/main">
+  <p:cSld>
     <p:bg>
       <p:bgPr>
         <a:solidFill>
@@ -15498,7 +17522,7 @@
                 <a:ea typeface="+mj-ea"/>
                 <a:cs typeface="+mj-cs"/>
               </a:rPr>
-              <a:t>50+ years later…</a:t>
+              <a:t>…50+ years later</a:t>
             </a:r>
           </a:p>
           <a:p>
@@ -16193,6 +18217,44 @@
           </a:p>
         </p:txBody>
       </p:sp>
+      <p:sp>
+        <p:nvSpPr>
+          <p:cNvPr id="2" name="TextBox 1">
+            <a:extLst>
+              <a:ext uri="{FF2B5EF4-FFF2-40B4-BE49-F238E27FC236}">
+                <a16:creationId xmlns:a16="http://schemas.microsoft.com/office/drawing/2014/main" id="{2DAF8F82-133B-4C58-AE1F-898141F1D360}"/>
+              </a:ext>
+            </a:extLst>
+          </p:cNvPr>
+          <p:cNvSpPr txBox="1"/>
+          <p:nvPr/>
+        </p:nvSpPr>
+        <p:spPr>
+          <a:xfrm>
+            <a:off x="531845" y="6405810"/>
+            <a:ext cx="3694922" cy="307777"/>
+          </a:xfrm>
+          <a:prstGeom prst="rect">
+            <a:avLst/>
+          </a:prstGeom>
+          <a:noFill/>
+        </p:spPr>
+        <p:txBody>
+          <a:bodyPr wrap="square" rtlCol="0">
+            <a:spAutoFit/>
+          </a:bodyPr>
+          <a:lstStyle/>
+          <a:p>
+            <a:r>
+              <a:rPr lang="en-US" sz="1400" dirty="0">
+                <a:hlinkClick r:id="rId6"/>
+              </a:rPr>
+              <a:t>The Void</a:t>
+            </a:r>
+            <a:endParaRPr lang="en-US" sz="1400" dirty="0"/>
+          </a:p>
+        </p:txBody>
+      </p:sp>
     </p:spTree>
     <p:extLst>
       <p:ext uri="{BB962C8B-B14F-4D97-AF65-F5344CB8AC3E}">
@@ -16206,7 +18268,7 @@
 </p:sld>
 </file>
 
-<file path=ppt/slides/slide3.xml><?xml version="1.0" encoding="utf-8"?>
+<file path=ppt/slides/slide4.xml><?xml version="1.0" encoding="utf-8"?>
 <p:sld xmlns:a="http://schemas.openxmlformats.org/drawingml/2006/main" xmlns:r="http://schemas.openxmlformats.org/officeDocument/2006/relationships" xmlns:p="http://schemas.openxmlformats.org/presentationml/2006/main">
   <p:cSld>
     <p:spTree>
@@ -16345,19 +18407,12 @@
               <a:rPr lang="en-US" sz="1400" dirty="0">
                 <a:hlinkClick r:id="rId4"/>
               </a:rPr>
-              <a:t>The Void</a:t>
+              <a:t>AR Mario</a:t>
             </a:r>
             <a:r>
               <a:rPr lang="en-US" sz="1400" dirty="0"/>
-              <a:t>   </a:t>
+              <a:t> </a:t>
             </a:r>
-            <a:r>
-              <a:rPr lang="en-US" sz="1400" dirty="0">
-                <a:hlinkClick r:id="rId5"/>
-              </a:rPr>
-              <a:t>AR Mario</a:t>
-            </a:r>
-            <a:endParaRPr lang="en-US" sz="1400" dirty="0"/>
           </a:p>
         </p:txBody>
       </p:sp>
@@ -16374,7 +18429,7 @@
 </p:sld>
 </file>
 
-<file path=ppt/slides/slide4.xml><?xml version="1.0" encoding="utf-8"?>
+<file path=ppt/slides/slide5.xml><?xml version="1.0" encoding="utf-8"?>
 <p:sld xmlns:a="http://schemas.openxmlformats.org/drawingml/2006/main" xmlns:r="http://schemas.openxmlformats.org/officeDocument/2006/relationships" xmlns:p="http://schemas.openxmlformats.org/presentationml/2006/main">
   <p:cSld>
     <p:bg>
@@ -16637,7 +18692,7 @@
 </p:sld>
 </file>
 
-<file path=ppt/slides/slide5.xml><?xml version="1.0" encoding="utf-8"?>
+<file path=ppt/slides/slide6.xml><?xml version="1.0" encoding="utf-8"?>
 <p:sld xmlns:a="http://schemas.openxmlformats.org/drawingml/2006/main" xmlns:r="http://schemas.openxmlformats.org/officeDocument/2006/relationships" xmlns:p="http://schemas.openxmlformats.org/presentationml/2006/main">
   <p:cSld>
     <p:bg>
@@ -17342,7 +19397,7 @@
 </p:sld>
 </file>
 
-<file path=ppt/slides/slide6.xml><?xml version="1.0" encoding="utf-8"?>
+<file path=ppt/slides/slide7.xml><?xml version="1.0" encoding="utf-8"?>
 <p:sld xmlns:a="http://schemas.openxmlformats.org/drawingml/2006/main" xmlns:r="http://schemas.openxmlformats.org/officeDocument/2006/relationships" xmlns:p="http://schemas.openxmlformats.org/presentationml/2006/main">
   <p:cSld>
     <p:bg>
@@ -17714,7 +19769,7 @@
           <a:p>
             <a:r>
               <a:rPr lang="en-US" sz="4000" dirty="0"/>
-              <a:t>ANDROID DEVELOPMENT</a:t>
+              <a:t>MOBILE AR</a:t>
             </a:r>
           </a:p>
         </p:txBody>
@@ -17987,7 +20042,7 @@
 </p:sld>
 </file>
 
-<file path=ppt/slides/slide7.xml><?xml version="1.0" encoding="utf-8"?>
+<file path=ppt/slides/slide8.xml><?xml version="1.0" encoding="utf-8"?>
 <p:sld xmlns:a="http://schemas.openxmlformats.org/drawingml/2006/main" xmlns:r="http://schemas.openxmlformats.org/officeDocument/2006/relationships" xmlns:p="http://schemas.openxmlformats.org/presentationml/2006/main">
   <p:cSld>
     <p:bg>
@@ -18359,7 +20414,7 @@
           <a:p>
             <a:r>
               <a:rPr lang="en-US" sz="4000" dirty="0"/>
-              <a:t>ANDROID DEVELOPMENT</a:t>
+              <a:t>MOBILE AR</a:t>
             </a:r>
           </a:p>
         </p:txBody>
@@ -18649,7 +20704,7 @@
 </p:sld>
 </file>
 
-<file path=ppt/slides/slide8.xml><?xml version="1.0" encoding="utf-8"?>
+<file path=ppt/slides/slide9.xml><?xml version="1.0" encoding="utf-8"?>
 <p:sld xmlns:a="http://schemas.openxmlformats.org/drawingml/2006/main" xmlns:r="http://schemas.openxmlformats.org/officeDocument/2006/relationships" xmlns:p="http://schemas.openxmlformats.org/presentationml/2006/main">
   <p:cSld>
     <p:bg>
@@ -19197,7 +21252,7 @@
         <p:spPr>
           <a:xfrm>
             <a:off x="6834006" y="3921023"/>
-            <a:ext cx="4142792" cy="584775"/>
+            <a:ext cx="4142792" cy="800219"/>
           </a:xfrm>
           <a:prstGeom prst="rect">
             <a:avLst/>
@@ -19226,8 +21281,15 @@
             </a:pPr>
             <a:r>
               <a:rPr lang="en-US" sz="1400" dirty="0"/>
-              <a:t>(under Assignments folder)</a:t>
+              <a:t>Assignments folder, Course Repository</a:t>
             </a:r>
+          </a:p>
+          <a:p>
+            <a:pPr marL="742950" lvl="1" indent="-285750">
+              <a:buFont typeface="Arial" panose="020B0604020202020204" pitchFamily="34" charset="0"/>
+              <a:buChar char="•"/>
+            </a:pPr>
+            <a:endParaRPr lang="en-US" sz="1400" dirty="0"/>
           </a:p>
         </p:txBody>
       </p:sp>
@@ -19235,598 +21297,6 @@
     <p:extLst>
       <p:ext uri="{BB962C8B-B14F-4D97-AF65-F5344CB8AC3E}">
         <p14:creationId xmlns:p14="http://schemas.microsoft.com/office/powerpoint/2010/main" val="2953262821"/>
-      </p:ext>
-    </p:extLst>
-  </p:cSld>
-  <p:clrMapOvr>
-    <a:masterClrMapping/>
-  </p:clrMapOvr>
-</p:sld>
-</file>
-
-<file path=ppt/slides/slide9.xml><?xml version="1.0" encoding="utf-8"?>
-<p:sld xmlns:a="http://schemas.openxmlformats.org/drawingml/2006/main" xmlns:r="http://schemas.openxmlformats.org/officeDocument/2006/relationships" xmlns:p="http://schemas.openxmlformats.org/presentationml/2006/main">
-  <p:cSld>
-    <p:bg>
-      <p:bgPr>
-        <a:solidFill>
-          <a:schemeClr val="bg1"/>
-        </a:solidFill>
-        <a:effectLst/>
-      </p:bgPr>
-    </p:bg>
-    <p:spTree>
-      <p:nvGrpSpPr>
-        <p:cNvPr id="1" name=""/>
-        <p:cNvGrpSpPr/>
-        <p:nvPr/>
-      </p:nvGrpSpPr>
-      <p:grpSpPr>
-        <a:xfrm>
-          <a:off x="0" y="0"/>
-          <a:ext cx="0" cy="0"/>
-          <a:chOff x="0" y="0"/>
-          <a:chExt cx="0" cy="0"/>
-        </a:xfrm>
-      </p:grpSpPr>
-      <p:sp useBgFill="1">
-        <p:nvSpPr>
-          <p:cNvPr id="8" name="Rectangle 7">
-            <a:extLst>
-              <a:ext uri="{FF2B5EF4-FFF2-40B4-BE49-F238E27FC236}">
-                <a16:creationId xmlns:a16="http://schemas.microsoft.com/office/drawing/2014/main" id="{DAF1966E-FD40-4A4A-B61B-C4DF7FA05F06}"/>
-              </a:ext>
-              <a:ext uri="{C183D7F6-B498-43B3-948B-1728B52AA6E4}">
-                <adec:decorative xmlns:adec="http://schemas.microsoft.com/office/drawing/2017/decorative" val="1"/>
-              </a:ext>
-            </a:extLst>
-          </p:cNvPr>
-          <p:cNvSpPr>
-            <a:spLocks noGrp="1" noRot="1" noChangeAspect="1" noMove="1" noResize="1" noEditPoints="1" noAdjustHandles="1" noChangeArrowheads="1" noChangeShapeType="1" noTextEdit="1"/>
-          </p:cNvSpPr>
-          <p:nvPr>
-            <p:extLst>
-              <p:ext uri="{386F3935-93C4-4BCD-93E2-E3B085C9AB24}">
-                <p16:designElem xmlns:p16="http://schemas.microsoft.com/office/powerpoint/2015/main" val="1"/>
-              </p:ext>
-            </p:extLst>
-          </p:nvPr>
-        </p:nvSpPr>
-        <p:spPr>
-          <a:xfrm>
-            <a:off x="0" y="0"/>
-            <a:ext cx="12192000" cy="6858000"/>
-          </a:xfrm>
-          <a:prstGeom prst="rect">
-            <a:avLst/>
-          </a:prstGeom>
-          <a:ln>
-            <a:noFill/>
-          </a:ln>
-        </p:spPr>
-        <p:style>
-          <a:lnRef idx="2">
-            <a:schemeClr val="accent1">
-              <a:shade val="50000"/>
-            </a:schemeClr>
-          </a:lnRef>
-          <a:fillRef idx="1">
-            <a:schemeClr val="accent1"/>
-          </a:fillRef>
-          <a:effectRef idx="0">
-            <a:schemeClr val="accent1"/>
-          </a:effectRef>
-          <a:fontRef idx="minor">
-            <a:schemeClr val="lt1"/>
-          </a:fontRef>
-        </p:style>
-        <p:txBody>
-          <a:bodyPr rtlCol="0" anchor="ctr"/>
-          <a:lstStyle/>
-          <a:p>
-            <a:pPr algn="ctr"/>
-            <a:endParaRPr lang="en-US"/>
-          </a:p>
-        </p:txBody>
-      </p:sp>
-      <p:sp useBgFill="1">
-        <p:nvSpPr>
-          <p:cNvPr id="10" name="Rectangle 9">
-            <a:extLst>
-              <a:ext uri="{FF2B5EF4-FFF2-40B4-BE49-F238E27FC236}">
-                <a16:creationId xmlns:a16="http://schemas.microsoft.com/office/drawing/2014/main" id="{047BFA19-D45E-416B-A404-7AF2F3F27017}"/>
-              </a:ext>
-              <a:ext uri="{C183D7F6-B498-43B3-948B-1728B52AA6E4}">
-                <adec:decorative xmlns:adec="http://schemas.microsoft.com/office/drawing/2017/decorative" val="1"/>
-              </a:ext>
-            </a:extLst>
-          </p:cNvPr>
-          <p:cNvSpPr>
-            <a:spLocks noGrp="1" noRot="1" noChangeAspect="1" noMove="1" noResize="1" noEditPoints="1" noAdjustHandles="1" noChangeArrowheads="1" noChangeShapeType="1" noTextEdit="1"/>
-          </p:cNvSpPr>
-          <p:nvPr>
-            <p:extLst>
-              <p:ext uri="{386F3935-93C4-4BCD-93E2-E3B085C9AB24}">
-                <p16:designElem xmlns:p16="http://schemas.microsoft.com/office/powerpoint/2015/main" val="1"/>
-              </p:ext>
-            </p:extLst>
-          </p:nvPr>
-        </p:nvSpPr>
-        <p:spPr>
-          <a:xfrm>
-            <a:off x="558209" y="0"/>
-            <a:ext cx="11167447" cy="2018806"/>
-          </a:xfrm>
-          <a:prstGeom prst="rect">
-            <a:avLst/>
-          </a:prstGeom>
-          <a:ln w="9525">
-            <a:solidFill>
-              <a:srgbClr val="E1E1E1"/>
-            </a:solidFill>
-          </a:ln>
-          <a:effectLst>
-            <a:outerShdw blurRad="50800" dist="38100" dir="2700000" algn="tl" rotWithShape="0">
-              <a:schemeClr val="bg1">
-                <a:lumMod val="85000"/>
-                <a:alpha val="50000"/>
-              </a:schemeClr>
-            </a:outerShdw>
-          </a:effectLst>
-        </p:spPr>
-        <p:style>
-          <a:lnRef idx="2">
-            <a:schemeClr val="accent1">
-              <a:shade val="50000"/>
-            </a:schemeClr>
-          </a:lnRef>
-          <a:fillRef idx="1">
-            <a:schemeClr val="accent1"/>
-          </a:fillRef>
-          <a:effectRef idx="0">
-            <a:schemeClr val="accent1"/>
-          </a:effectRef>
-          <a:fontRef idx="minor">
-            <a:schemeClr val="lt1"/>
-          </a:fontRef>
-        </p:style>
-        <p:txBody>
-          <a:bodyPr rtlCol="0" anchor="ctr"/>
-          <a:lstStyle/>
-          <a:p>
-            <a:pPr marL="0" marR="0" lvl="0" indent="0" algn="ctr" defTabSz="914400" rtl="0" eaLnBrk="1" fontAlgn="auto" latinLnBrk="0" hangingPunct="1">
-              <a:lnSpc>
-                <a:spcPct val="100000"/>
-              </a:lnSpc>
-              <a:spcBef>
-                <a:spcPts val="0"/>
-              </a:spcBef>
-              <a:spcAft>
-                <a:spcPts val="0"/>
-              </a:spcAft>
-              <a:buClrTx/>
-              <a:buSzTx/>
-              <a:buFontTx/>
-              <a:buNone/>
-              <a:tabLst/>
-              <a:defRPr/>
-            </a:pPr>
-            <a:endParaRPr kumimoji="0" lang="en-US" sz="1800" b="0" i="0" u="none" strike="noStrike" kern="1200" cap="none" spc="0" normalizeH="0" baseline="0" noProof="0">
-              <a:ln>
-                <a:noFill/>
-              </a:ln>
-              <a:solidFill>
-                <a:prstClr val="white"/>
-              </a:solidFill>
-              <a:effectLst/>
-              <a:uLnTx/>
-              <a:uFillTx/>
-              <a:latin typeface="Calibri" panose="020F0502020204030204"/>
-              <a:ea typeface="+mn-ea"/>
-              <a:cs typeface="+mn-cs"/>
-            </a:endParaRPr>
-          </a:p>
-        </p:txBody>
-      </p:sp>
-      <p:sp useBgFill="1">
-        <p:nvSpPr>
-          <p:cNvPr id="12" name="Rectangle 11">
-            <a:extLst>
-              <a:ext uri="{FF2B5EF4-FFF2-40B4-BE49-F238E27FC236}">
-                <a16:creationId xmlns:a16="http://schemas.microsoft.com/office/drawing/2014/main" id="{8E0105E7-23DB-4CF2-8258-FF47C7620F6E}"/>
-              </a:ext>
-              <a:ext uri="{C183D7F6-B498-43B3-948B-1728B52AA6E4}">
-                <adec:decorative xmlns:adec="http://schemas.microsoft.com/office/drawing/2017/decorative" val="1"/>
-              </a:ext>
-            </a:extLst>
-          </p:cNvPr>
-          <p:cNvSpPr>
-            <a:spLocks noGrp="1" noRot="1" noChangeAspect="1" noMove="1" noResize="1" noEditPoints="1" noAdjustHandles="1" noChangeArrowheads="1" noChangeShapeType="1" noTextEdit="1"/>
-          </p:cNvSpPr>
-          <p:nvPr>
-            <p:extLst>
-              <p:ext uri="{386F3935-93C4-4BCD-93E2-E3B085C9AB24}">
-                <p16:designElem xmlns:p16="http://schemas.microsoft.com/office/powerpoint/2015/main" val="1"/>
-              </p:ext>
-            </p:extLst>
-          </p:nvPr>
-        </p:nvSpPr>
-        <p:spPr>
-          <a:xfrm>
-            <a:off x="566928" y="0"/>
-            <a:ext cx="11155680" cy="2011680"/>
-          </a:xfrm>
-          <a:prstGeom prst="rect">
-            <a:avLst/>
-          </a:prstGeom>
-          <a:ln w="9525">
-            <a:noFill/>
-          </a:ln>
-          <a:effectLst/>
-        </p:spPr>
-        <p:style>
-          <a:lnRef idx="2">
-            <a:schemeClr val="accent1">
-              <a:shade val="50000"/>
-            </a:schemeClr>
-          </a:lnRef>
-          <a:fillRef idx="1">
-            <a:schemeClr val="accent1"/>
-          </a:fillRef>
-          <a:effectRef idx="0">
-            <a:schemeClr val="accent1"/>
-          </a:effectRef>
-          <a:fontRef idx="minor">
-            <a:schemeClr val="lt1"/>
-          </a:fontRef>
-        </p:style>
-        <p:txBody>
-          <a:bodyPr rtlCol="0" anchor="ctr"/>
-          <a:lstStyle/>
-          <a:p>
-            <a:pPr marL="0" marR="0" lvl="0" indent="0" algn="ctr" defTabSz="914400" rtl="0" eaLnBrk="1" fontAlgn="auto" latinLnBrk="0" hangingPunct="1">
-              <a:lnSpc>
-                <a:spcPct val="100000"/>
-              </a:lnSpc>
-              <a:spcBef>
-                <a:spcPts val="0"/>
-              </a:spcBef>
-              <a:spcAft>
-                <a:spcPts val="0"/>
-              </a:spcAft>
-              <a:buClrTx/>
-              <a:buSzTx/>
-              <a:buFontTx/>
-              <a:buNone/>
-              <a:tabLst/>
-              <a:defRPr/>
-            </a:pPr>
-            <a:endParaRPr kumimoji="0" lang="en-US" sz="1800" b="0" i="0" u="none" strike="noStrike" kern="1200" cap="none" spc="0" normalizeH="0" baseline="0" noProof="0">
-              <a:ln>
-                <a:noFill/>
-              </a:ln>
-              <a:solidFill>
-                <a:prstClr val="white"/>
-              </a:solidFill>
-              <a:effectLst/>
-              <a:uLnTx/>
-              <a:uFillTx/>
-              <a:latin typeface="Calibri" panose="020F0502020204030204"/>
-              <a:ea typeface="+mn-ea"/>
-              <a:cs typeface="+mn-cs"/>
-            </a:endParaRPr>
-          </a:p>
-        </p:txBody>
-      </p:sp>
-      <p:sp>
-        <p:nvSpPr>
-          <p:cNvPr id="14" name="Rectangle 13">
-            <a:extLst>
-              <a:ext uri="{FF2B5EF4-FFF2-40B4-BE49-F238E27FC236}">
-                <a16:creationId xmlns:a16="http://schemas.microsoft.com/office/drawing/2014/main" id="{074B4F7D-14B2-478B-8BF5-01E4E0C5D263}"/>
-              </a:ext>
-              <a:ext uri="{C183D7F6-B498-43B3-948B-1728B52AA6E4}">
-                <adec:decorative xmlns:adec="http://schemas.microsoft.com/office/drawing/2017/decorative" val="1"/>
-              </a:ext>
-            </a:extLst>
-          </p:cNvPr>
-          <p:cNvSpPr>
-            <a:spLocks noGrp="1" noRot="1" noChangeAspect="1" noMove="1" noResize="1" noEditPoints="1" noAdjustHandles="1" noChangeArrowheads="1" noChangeShapeType="1" noTextEdit="1"/>
-          </p:cNvSpPr>
-          <p:nvPr>
-            <p:extLst>
-              <p:ext uri="{386F3935-93C4-4BCD-93E2-E3B085C9AB24}">
-                <p16:designElem xmlns:p16="http://schemas.microsoft.com/office/powerpoint/2015/main" val="1"/>
-              </p:ext>
-            </p:extLst>
-          </p:nvPr>
-        </p:nvSpPr>
-        <p:spPr>
-          <a:xfrm>
-            <a:off x="498834" y="758952"/>
-            <a:ext cx="128016" cy="704088"/>
-          </a:xfrm>
-          <a:prstGeom prst="rect">
-            <a:avLst/>
-          </a:prstGeom>
-          <a:solidFill>
-            <a:schemeClr val="accent2"/>
-          </a:solidFill>
-          <a:ln>
-            <a:noFill/>
-          </a:ln>
-        </p:spPr>
-        <p:style>
-          <a:lnRef idx="2">
-            <a:schemeClr val="accent1">
-              <a:shade val="50000"/>
-            </a:schemeClr>
-          </a:lnRef>
-          <a:fillRef idx="1">
-            <a:schemeClr val="accent1"/>
-          </a:fillRef>
-          <a:effectRef idx="0">
-            <a:schemeClr val="accent1"/>
-          </a:effectRef>
-          <a:fontRef idx="minor">
-            <a:schemeClr val="lt1"/>
-          </a:fontRef>
-        </p:style>
-        <p:txBody>
-          <a:bodyPr rtlCol="0" anchor="ctr"/>
-          <a:lstStyle/>
-          <a:p>
-            <a:pPr algn="ctr"/>
-            <a:endParaRPr lang="en-US">
-              <a:solidFill>
-                <a:prstClr val="white"/>
-              </a:solidFill>
-              <a:latin typeface="Calibri" panose="020F0502020204030204"/>
-            </a:endParaRPr>
-          </a:p>
-        </p:txBody>
-      </p:sp>
-      <p:sp>
-        <p:nvSpPr>
-          <p:cNvPr id="16" name="Title 1">
-            <a:extLst>
-              <a:ext uri="{FF2B5EF4-FFF2-40B4-BE49-F238E27FC236}">
-                <a16:creationId xmlns:a16="http://schemas.microsoft.com/office/drawing/2014/main" id="{C83D6A4E-8F21-43C5-B459-0611CB001524}"/>
-              </a:ext>
-            </a:extLst>
-          </p:cNvPr>
-          <p:cNvSpPr>
-            <a:spLocks noGrp="1"/>
-          </p:cNvSpPr>
-          <p:nvPr>
-            <p:ph type="title"/>
-          </p:nvPr>
-        </p:nvSpPr>
-        <p:spPr>
-          <a:xfrm>
-            <a:off x="2549932" y="548640"/>
-            <a:ext cx="8733763" cy="1179576"/>
-          </a:xfrm>
-        </p:spPr>
-        <p:txBody>
-          <a:bodyPr>
-            <a:normAutofit/>
-          </a:bodyPr>
-          <a:lstStyle/>
-          <a:p>
-            <a:r>
-              <a:rPr lang="en-US" sz="4000" dirty="0"/>
-              <a:t>Touchscreen Interactions</a:t>
-            </a:r>
-          </a:p>
-        </p:txBody>
-      </p:sp>
-      <p:sp>
-        <p:nvSpPr>
-          <p:cNvPr id="20" name="TextBox 19">
-            <a:extLst>
-              <a:ext uri="{FF2B5EF4-FFF2-40B4-BE49-F238E27FC236}">
-                <a16:creationId xmlns:a16="http://schemas.microsoft.com/office/drawing/2014/main" id="{9E38DAAA-7FA9-4A63-B74B-CA623D1FEE85}"/>
-              </a:ext>
-            </a:extLst>
-          </p:cNvPr>
-          <p:cNvSpPr txBox="1"/>
-          <p:nvPr/>
-        </p:nvSpPr>
-        <p:spPr>
-          <a:xfrm>
-            <a:off x="9199984" y="6405810"/>
-            <a:ext cx="2896940" cy="307777"/>
-          </a:xfrm>
-          <a:prstGeom prst="rect">
-            <a:avLst/>
-          </a:prstGeom>
-          <a:noFill/>
-        </p:spPr>
-        <p:txBody>
-          <a:bodyPr wrap="square" rtlCol="0">
-            <a:spAutoFit/>
-          </a:bodyPr>
-          <a:lstStyle/>
-          <a:p>
-            <a:pPr>
-              <a:spcAft>
-                <a:spcPts val="600"/>
-              </a:spcAft>
-            </a:pPr>
-            <a:r>
-              <a:rPr lang="en-US" sz="1400" dirty="0"/>
-              <a:t>[10] </a:t>
-            </a:r>
-            <a:r>
-              <a:rPr lang="en-US" sz="1400" dirty="0">
-                <a:solidFill>
-                  <a:srgbClr val="000000"/>
-                </a:solidFill>
-                <a:hlinkClick r:id="rId2"/>
-              </a:rPr>
-              <a:t>Touch Gestures</a:t>
-            </a:r>
-            <a:r>
-              <a:rPr lang="en-US" sz="1400" dirty="0">
-                <a:solidFill>
-                  <a:srgbClr val="000000"/>
-                </a:solidFill>
-              </a:rPr>
-              <a:t> [11] </a:t>
-            </a:r>
-            <a:r>
-              <a:rPr lang="en-US" sz="1400" dirty="0" err="1">
-                <a:solidFill>
-                  <a:srgbClr val="000000"/>
-                </a:solidFill>
-                <a:hlinkClick r:id="rId3"/>
-              </a:rPr>
-              <a:t>JoystickPack</a:t>
-            </a:r>
-            <a:endParaRPr lang="en-US" sz="1400" dirty="0">
-              <a:solidFill>
-                <a:srgbClr val="000000"/>
-              </a:solidFill>
-            </a:endParaRPr>
-          </a:p>
-        </p:txBody>
-      </p:sp>
-      <p:pic>
-        <p:nvPicPr>
-          <p:cNvPr id="3" name="Picture 2" descr="A close up of text on a white background&#10;&#10;Description automatically generated">
-            <a:extLst>
-              <a:ext uri="{FF2B5EF4-FFF2-40B4-BE49-F238E27FC236}">
-                <a16:creationId xmlns:a16="http://schemas.microsoft.com/office/drawing/2014/main" id="{A9BCB4C6-F16E-49E6-AA1D-ED7545EE5556}"/>
-              </a:ext>
-            </a:extLst>
-          </p:cNvPr>
-          <p:cNvPicPr>
-            <a:picLocks noChangeAspect="1"/>
-          </p:cNvPicPr>
-          <p:nvPr/>
-        </p:nvPicPr>
-        <p:blipFill>
-          <a:blip r:embed="rId4">
-            <a:extLst>
-              <a:ext uri="{28A0092B-C50C-407E-A947-70E740481C1C}">
-                <a14:useLocalDpi xmlns:a14="http://schemas.microsoft.com/office/drawing/2010/main" val="0"/>
-              </a:ext>
-            </a:extLst>
-          </a:blip>
-          <a:stretch>
-            <a:fillRect/>
-          </a:stretch>
-        </p:blipFill>
-        <p:spPr>
-          <a:xfrm>
-            <a:off x="1128020" y="2458023"/>
-            <a:ext cx="4328618" cy="3821289"/>
-          </a:xfrm>
-          <a:prstGeom prst="rect">
-            <a:avLst/>
-          </a:prstGeom>
-        </p:spPr>
-      </p:pic>
-      <p:pic>
-        <p:nvPicPr>
-          <p:cNvPr id="5" name="Picture 4" descr="A close up of a sign&#10;&#10;Description automatically generated">
-            <a:extLst>
-              <a:ext uri="{FF2B5EF4-FFF2-40B4-BE49-F238E27FC236}">
-                <a16:creationId xmlns:a16="http://schemas.microsoft.com/office/drawing/2014/main" id="{D519BBBC-6A7D-4390-B15B-40C8A4831884}"/>
-              </a:ext>
-            </a:extLst>
-          </p:cNvPr>
-          <p:cNvPicPr>
-            <a:picLocks noChangeAspect="1"/>
-          </p:cNvPicPr>
-          <p:nvPr/>
-        </p:nvPicPr>
-        <p:blipFill>
-          <a:blip r:embed="rId5">
-            <a:extLst>
-              <a:ext uri="{28A0092B-C50C-407E-A947-70E740481C1C}">
-                <a14:useLocalDpi xmlns:a14="http://schemas.microsoft.com/office/drawing/2010/main" val="0"/>
-              </a:ext>
-            </a:extLst>
-          </a:blip>
-          <a:stretch>
-            <a:fillRect/>
-          </a:stretch>
-        </p:blipFill>
-        <p:spPr>
-          <a:xfrm>
-            <a:off x="6163054" y="2458023"/>
-            <a:ext cx="4867954" cy="3667637"/>
-          </a:xfrm>
-          <a:prstGeom prst="rect">
-            <a:avLst/>
-          </a:prstGeom>
-        </p:spPr>
-      </p:pic>
-      <p:sp>
-        <p:nvSpPr>
-          <p:cNvPr id="9" name="Rectangle 8" descr="Document">
-            <a:extLst>
-              <a:ext uri="{FF2B5EF4-FFF2-40B4-BE49-F238E27FC236}">
-                <a16:creationId xmlns:a16="http://schemas.microsoft.com/office/drawing/2014/main" id="{AC528256-190B-4849-83F5-8B919289C577}"/>
-              </a:ext>
-            </a:extLst>
-          </p:cNvPr>
-          <p:cNvSpPr/>
-          <p:nvPr/>
-        </p:nvSpPr>
-        <p:spPr>
-          <a:xfrm>
-            <a:off x="783336" y="357772"/>
-            <a:ext cx="1300252" cy="1300252"/>
-          </a:xfrm>
-          <a:prstGeom prst="rect">
-            <a:avLst/>
-          </a:prstGeom>
-          <a:blipFill>
-            <a:blip r:embed="rId6">
-              <a:extLst>
-                <a:ext uri="{28A0092B-C50C-407E-A947-70E740481C1C}">
-                  <a14:useLocalDpi xmlns:a14="http://schemas.microsoft.com/office/drawing/2010/main" val="0"/>
-                </a:ext>
-                <a:ext uri="{96DAC541-7B7A-43D3-8B79-37D633B846F1}">
-                  <asvg:svgBlip xmlns:asvg="http://schemas.microsoft.com/office/drawing/2016/SVG/main" r:embed="rId7"/>
-                </a:ext>
-              </a:extLst>
-            </a:blip>
-            <a:stretch>
-              <a:fillRect/>
-            </a:stretch>
-          </a:blipFill>
-          <a:ln>
-            <a:noFill/>
-          </a:ln>
-        </p:spPr>
-        <p:style>
-          <a:lnRef idx="2">
-            <a:scrgbClr r="0" g="0" b="0"/>
-          </a:lnRef>
-          <a:fillRef idx="1">
-            <a:scrgbClr r="0" g="0" b="0"/>
-          </a:fillRef>
-          <a:effectRef idx="0">
-            <a:schemeClr val="accent4">
-              <a:hueOff val="0"/>
-              <a:satOff val="0"/>
-              <a:lumOff val="0"/>
-              <a:alphaOff val="0"/>
-            </a:schemeClr>
-          </a:effectRef>
-          <a:fontRef idx="minor">
-            <a:schemeClr val="lt1"/>
-          </a:fontRef>
-        </p:style>
-      </p:sp>
-    </p:spTree>
-    <p:extLst>
-      <p:ext uri="{BB962C8B-B14F-4D97-AF65-F5344CB8AC3E}">
-        <p14:creationId xmlns:p14="http://schemas.microsoft.com/office/powerpoint/2010/main" val="879826707"/>
       </p:ext>
     </p:extLst>
   </p:cSld>

</xml_diff>